<commit_message>
Update decision tree slides
</commit_message>
<xml_diff>
--- a/Decision trees/Slides/Decision Trees.pptx
+++ b/Decision trees/Slides/Decision Trees.pptx
@@ -1221,7 +1221,7 @@
                 <a:cs typeface="Calibri"/>
                 <a:sym typeface="Calibri"/>
               </a:rPr>
-              <a:t>‹Nº›</a:t>
+              <a:t>‹#›</a:t>
             </a:fld>
             <a:endParaRPr sz="1200" b="0" i="0" u="none" strike="noStrike" cap="none">
               <a:solidFill>
@@ -1971,7 +1971,7 @@
         </p:nvSpPr>
         <p:spPr>
           <a:xfrm>
-            <a:off x="1143300" y="685800"/>
+            <a:off x="1143000" y="685800"/>
             <a:ext cx="4572000" cy="3429000"/>
           </a:xfrm>
           <a:custGeom>
@@ -2079,7 +2079,7 @@
         </p:nvSpPr>
         <p:spPr>
           <a:xfrm>
-            <a:off x="1143300" y="685800"/>
+            <a:off x="1143000" y="685800"/>
             <a:ext cx="4572000" cy="3429000"/>
           </a:xfrm>
           <a:custGeom>
@@ -2187,7 +2187,7 @@
         </p:nvSpPr>
         <p:spPr>
           <a:xfrm>
-            <a:off x="1143300" y="685800"/>
+            <a:off x="1143000" y="685800"/>
             <a:ext cx="4572000" cy="3429000"/>
           </a:xfrm>
           <a:custGeom>
@@ -2295,7 +2295,7 @@
         </p:nvSpPr>
         <p:spPr>
           <a:xfrm>
-            <a:off x="1143300" y="685800"/>
+            <a:off x="1143000" y="685800"/>
             <a:ext cx="4572000" cy="3429000"/>
           </a:xfrm>
           <a:custGeom>
@@ -2403,7 +2403,7 @@
         </p:nvSpPr>
         <p:spPr>
           <a:xfrm>
-            <a:off x="1143300" y="685800"/>
+            <a:off x="1143000" y="685800"/>
             <a:ext cx="4572000" cy="3429000"/>
           </a:xfrm>
           <a:custGeom>
@@ -2511,7 +2511,7 @@
         </p:nvSpPr>
         <p:spPr>
           <a:xfrm>
-            <a:off x="1143300" y="685800"/>
+            <a:off x="1143000" y="685800"/>
             <a:ext cx="4572000" cy="3429000"/>
           </a:xfrm>
           <a:custGeom>
@@ -3251,7 +3251,7 @@
             </a:pPr>
             <a:fld id="{00000000-1234-1234-1234-123412341234}" type="slidenum">
               <a:rPr lang="nl-NL"/>
-              <a:t>‹Nº›</a:t>
+              <a:t>‹#›</a:t>
             </a:fld>
             <a:endParaRPr/>
           </a:p>
@@ -4367,7 +4367,7 @@
             </a:pPr>
             <a:fld id="{00000000-1234-1234-1234-123412341234}" type="slidenum">
               <a:rPr lang="nl-NL"/>
-              <a:t>‹Nº›</a:t>
+              <a:t>‹#›</a:t>
             </a:fld>
             <a:endParaRPr/>
           </a:p>
@@ -4926,7 +4926,7 @@
             </a:pPr>
             <a:fld id="{00000000-1234-1234-1234-123412341234}" type="slidenum">
               <a:rPr lang="nl-NL"/>
-              <a:t>‹Nº›</a:t>
+              <a:t>‹#›</a:t>
             </a:fld>
             <a:endParaRPr/>
           </a:p>
@@ -5483,7 +5483,7 @@
             </a:pPr>
             <a:fld id="{00000000-1234-1234-1234-123412341234}" type="slidenum">
               <a:rPr lang="nl-NL"/>
-              <a:t>‹Nº›</a:t>
+              <a:t>‹#›</a:t>
             </a:fld>
             <a:endParaRPr/>
           </a:p>
@@ -5714,7 +5714,7 @@
             </a:pPr>
             <a:fld id="{00000000-1234-1234-1234-123412341234}" type="slidenum">
               <a:rPr lang="nl-NL"/>
-              <a:t>‹Nº›</a:t>
+              <a:t>‹#›</a:t>
             </a:fld>
             <a:endParaRPr/>
           </a:p>
@@ -6234,7 +6234,7 @@
             </a:pPr>
             <a:fld id="{00000000-1234-1234-1234-123412341234}" type="slidenum">
               <a:rPr lang="nl-NL"/>
-              <a:t>‹Nº›</a:t>
+              <a:t>‹#›</a:t>
             </a:fld>
             <a:endParaRPr/>
           </a:p>
@@ -6465,7 +6465,7 @@
             </a:pPr>
             <a:fld id="{00000000-1234-1234-1234-123412341234}" type="slidenum">
               <a:rPr lang="nl-NL"/>
-              <a:t>‹Nº›</a:t>
+              <a:t>‹#›</a:t>
             </a:fld>
             <a:endParaRPr/>
           </a:p>
@@ -6823,7 +6823,7 @@
             </a:pPr>
             <a:fld id="{00000000-1234-1234-1234-123412341234}" type="slidenum">
               <a:rPr lang="nl-NL"/>
-              <a:t>‹Nº›</a:t>
+              <a:t>‹#›</a:t>
             </a:fld>
             <a:endParaRPr/>
           </a:p>
@@ -7336,7 +7336,7 @@
             </a:pPr>
             <a:fld id="{00000000-1234-1234-1234-123412341234}" type="slidenum">
               <a:rPr lang="nl-NL"/>
-              <a:t>‹Nº›</a:t>
+              <a:t>‹#›</a:t>
             </a:fld>
             <a:endParaRPr/>
           </a:p>
@@ -7567,7 +7567,7 @@
             </a:pPr>
             <a:fld id="{00000000-1234-1234-1234-123412341234}" type="slidenum">
               <a:rPr lang="nl-NL"/>
-              <a:t>‹Nº›</a:t>
+              <a:t>‹#›</a:t>
             </a:fld>
             <a:endParaRPr/>
           </a:p>
@@ -7925,7 +7925,7 @@
             </a:pPr>
             <a:fld id="{00000000-1234-1234-1234-123412341234}" type="slidenum">
               <a:rPr lang="nl-NL"/>
-              <a:t>‹Nº›</a:t>
+              <a:t>‹#›</a:t>
             </a:fld>
             <a:endParaRPr/>
           </a:p>
@@ -8409,7 +8409,7 @@
             </a:pPr>
             <a:fld id="{00000000-1234-1234-1234-123412341234}" type="slidenum">
               <a:rPr lang="nl-NL"/>
-              <a:t>‹Nº›</a:t>
+              <a:t>‹#›</a:t>
             </a:fld>
             <a:endParaRPr/>
           </a:p>
@@ -9328,7 +9328,7 @@
             </a:pPr>
             <a:fld id="{00000000-1234-1234-1234-123412341234}" type="slidenum">
               <a:rPr lang="nl-NL"/>
-              <a:t>‹Nº›</a:t>
+              <a:t>‹#›</a:t>
             </a:fld>
             <a:endParaRPr/>
           </a:p>
@@ -10068,7 +10068,7 @@
             </a:pPr>
             <a:fld id="{00000000-1234-1234-1234-123412341234}" type="slidenum">
               <a:rPr lang="nl-NL"/>
-              <a:t>‹Nº›</a:t>
+              <a:t>‹#›</a:t>
             </a:fld>
             <a:endParaRPr/>
           </a:p>
@@ -10782,7 +10782,7 @@
             </a:pPr>
             <a:fld id="{00000000-1234-1234-1234-123412341234}" type="slidenum">
               <a:rPr lang="nl-NL"/>
-              <a:t>‹Nº›</a:t>
+              <a:t>‹#›</a:t>
             </a:fld>
             <a:endParaRPr/>
           </a:p>
@@ -11522,7 +11522,7 @@
             </a:pPr>
             <a:fld id="{00000000-1234-1234-1234-123412341234}" type="slidenum">
               <a:rPr lang="nl-NL"/>
-              <a:t>‹Nº›</a:t>
+              <a:t>‹#›</a:t>
             </a:fld>
             <a:endParaRPr/>
           </a:p>
@@ -11593,32 +11593,6 @@
           </a:p>
         </p:txBody>
       </p:sp>
-      <p:cxnSp>
-        <p:nvCxnSpPr>
-          <p:cNvPr id="213" name="Google Shape;213;p33"/>
-          <p:cNvCxnSpPr/>
-          <p:nvPr/>
-        </p:nvCxnSpPr>
-        <p:spPr>
-          <a:xfrm>
-            <a:off x="5029675" y="5994000"/>
-            <a:ext cx="468300" cy="0"/>
-          </a:xfrm>
-          <a:prstGeom prst="straightConnector1">
-            <a:avLst/>
-          </a:prstGeom>
-          <a:noFill/>
-          <a:ln w="19050" cap="flat" cmpd="sng">
-            <a:solidFill>
-              <a:schemeClr val="lt1"/>
-            </a:solidFill>
-            <a:prstDash val="solid"/>
-            <a:round/>
-            <a:headEnd type="none" w="sm" len="sm"/>
-            <a:tailEnd type="none" w="sm" len="sm"/>
-          </a:ln>
-        </p:spPr>
-      </p:cxnSp>
       <p:sp>
         <p:nvSpPr>
           <p:cNvPr id="214" name="Google Shape;214;p33"/>
@@ -12072,7 +12046,7 @@
             </a:pPr>
             <a:fld id="{00000000-1234-1234-1234-123412341234}" type="slidenum">
               <a:rPr lang="nl-NL"/>
-              <a:t>‹Nº›</a:t>
+              <a:t>‹#›</a:t>
             </a:fld>
             <a:endParaRPr/>
           </a:p>
@@ -12278,7 +12252,7 @@
             </a:pPr>
             <a:fld id="{00000000-1234-1234-1234-123412341234}" type="slidenum">
               <a:rPr lang="nl-NL"/>
-              <a:t>‹Nº›</a:t>
+              <a:t>‹#›</a:t>
             </a:fld>
             <a:endParaRPr/>
           </a:p>
@@ -12436,7 +12410,7 @@
             </a:pPr>
             <a:fld id="{00000000-1234-1234-1234-123412341234}" type="slidenum">
               <a:rPr lang="nl-NL"/>
-              <a:t>‹Nº›</a:t>
+              <a:t>‹#›</a:t>
             </a:fld>
             <a:endParaRPr/>
           </a:p>
@@ -12796,7 +12770,7 @@
             </a:pPr>
             <a:fld id="{00000000-1234-1234-1234-123412341234}" type="slidenum">
               <a:rPr lang="nl-NL"/>
-              <a:t>‹Nº›</a:t>
+              <a:t>‹#›</a:t>
             </a:fld>
             <a:endParaRPr/>
           </a:p>
@@ -12900,7 +12874,7 @@
             </a:pPr>
             <a:fld id="{00000000-1234-1234-1234-123412341234}" type="slidenum">
               <a:rPr lang="nl-NL"/>
-              <a:t>‹Nº›</a:t>
+              <a:t>‹#›</a:t>
             </a:fld>
             <a:endParaRPr/>
           </a:p>
@@ -13041,7 +13015,7 @@
           <a:p>
             <a:fld id="{DDFCD08C-45F2-4972-B58E-0165F8DD73B3}" type="datetime1">
               <a:rPr lang="en-US" smtClean="0"/>
-              <a:t>3/22/19</a:t>
+              <a:t>1/27/20</a:t>
             </a:fld>
             <a:endParaRPr lang="en-US"/>
           </a:p>
@@ -13064,7 +13038,7 @@
           <a:p>
             <a:fld id="{0798D939-2D9E-2142-A80A-FFDECD1E5A9B}" type="slidenum">
               <a:rPr lang="en-US" smtClean="0"/>
-              <a:t>‹Nº›</a:t>
+              <a:t>‹#›</a:t>
             </a:fld>
             <a:endParaRPr lang="en-US"/>
           </a:p>
@@ -13902,7 +13876,7 @@
             </a:pPr>
             <a:fld id="{00000000-1234-1234-1234-123412341234}" type="slidenum">
               <a:rPr lang="nl-NL"/>
-              <a:t>‹Nº›</a:t>
+              <a:t>‹#›</a:t>
             </a:fld>
             <a:endParaRPr/>
           </a:p>
@@ -15142,7 +15116,7 @@
             </a:pPr>
             <a:fld id="{00000000-1234-1234-1234-123412341234}" type="slidenum">
               <a:rPr lang="nl-NL"/>
-              <a:t>‹Nº›</a:t>
+              <a:t>‹#›</a:t>
             </a:fld>
             <a:endParaRPr/>
           </a:p>
@@ -16860,7 +16834,7 @@
             </a:pPr>
             <a:fld id="{00000000-1234-1234-1234-123412341234}" type="slidenum">
               <a:rPr lang="nl-NL"/>
-              <a:t>‹Nº›</a:t>
+              <a:t>‹#›</a:t>
             </a:fld>
             <a:endParaRPr/>
           </a:p>
@@ -17622,7 +17596,7 @@
             </a:pPr>
             <a:fld id="{00000000-1234-1234-1234-123412341234}" type="slidenum">
               <a:rPr lang="nl-NL"/>
-              <a:t>‹Nº›</a:t>
+              <a:t>‹#›</a:t>
             </a:fld>
             <a:endParaRPr/>
           </a:p>
@@ -18623,7 +18597,7 @@
             </a:pPr>
             <a:fld id="{00000000-1234-1234-1234-123412341234}" type="slidenum">
               <a:rPr lang="nl-NL"/>
-              <a:t>‹Nº›</a:t>
+              <a:t>‹#›</a:t>
             </a:fld>
             <a:endParaRPr/>
           </a:p>
@@ -20102,7 +20076,7 @@
             </a:pPr>
             <a:fld id="{00000000-1234-1234-1234-123412341234}" type="slidenum">
               <a:rPr lang="nl-NL"/>
-              <a:t>‹Nº›</a:t>
+              <a:t>‹#›</a:t>
             </a:fld>
             <a:endParaRPr/>
           </a:p>
@@ -21103,7 +21077,7 @@
             </a:pPr>
             <a:fld id="{00000000-1234-1234-1234-123412341234}" type="slidenum">
               <a:rPr lang="nl-NL"/>
-              <a:t>‹Nº›</a:t>
+              <a:t>‹#›</a:t>
             </a:fld>
             <a:endParaRPr/>
           </a:p>
@@ -21957,7 +21931,7 @@
             </a:pPr>
             <a:fld id="{00000000-1234-1234-1234-123412341234}" type="slidenum">
               <a:rPr lang="nl-NL"/>
-              <a:t>‹Nº›</a:t>
+              <a:t>‹#›</a:t>
             </a:fld>
             <a:endParaRPr/>
           </a:p>
@@ -23759,7 +23733,7 @@
             </a:pPr>
             <a:fld id="{00000000-1234-1234-1234-123412341234}" type="slidenum">
               <a:rPr lang="nl-NL"/>
-              <a:t>‹Nº›</a:t>
+              <a:t>‹#›</a:t>
             </a:fld>
             <a:endParaRPr/>
           </a:p>
@@ -24735,7 +24709,7 @@
               </a:spcAft>
               <a:buNone/>
             </a:pPr>
-            <a:endParaRPr/>
+            <a:endParaRPr dirty="0"/>
           </a:p>
         </p:txBody>
       </p:sp>
@@ -25056,6 +25030,58 @@
               <a:t>c.HCld;  e.HCld</a:t>
             </a:r>
             <a:endParaRPr/>
+          </a:p>
+        </p:txBody>
+      </p:sp>
+      <p:sp>
+        <p:nvSpPr>
+          <p:cNvPr id="2" name="TextBox 1">
+            <a:extLst>
+              <a:ext uri="{FF2B5EF4-FFF2-40B4-BE49-F238E27FC236}">
+                <a16:creationId xmlns:a16="http://schemas.microsoft.com/office/drawing/2014/main" id="{73D75C2F-D431-9F4D-9BB2-FD388DFC88C3}"/>
+              </a:ext>
+            </a:extLst>
+          </p:cNvPr>
+          <p:cNvSpPr txBox="1"/>
+          <p:nvPr/>
+        </p:nvSpPr>
+        <p:spPr>
+          <a:xfrm>
+            <a:off x="100" y="6454959"/>
+            <a:ext cx="5509449" cy="307777"/>
+          </a:xfrm>
+          <a:prstGeom prst="rect">
+            <a:avLst/>
+          </a:prstGeom>
+          <a:noFill/>
+        </p:spPr>
+        <p:txBody>
+          <a:bodyPr wrap="square" rtlCol="0">
+            <a:spAutoFit/>
+          </a:bodyPr>
+          <a:lstStyle/>
+          <a:p>
+            <a:r>
+              <a:rPr lang="en-US" dirty="0">
+                <a:solidFill>
+                  <a:schemeClr val="bg2"/>
+                </a:solidFill>
+              </a:rPr>
+              <a:t>Decision tree made in </a:t>
+            </a:r>
+            <a:r>
+              <a:rPr lang="en-US" dirty="0" err="1">
+                <a:solidFill>
+                  <a:schemeClr val="bg2"/>
+                </a:solidFill>
+              </a:rPr>
+              <a:t>myopenTree.com</a:t>
+            </a:r>
+            <a:endParaRPr lang="en-US" dirty="0">
+              <a:solidFill>
+                <a:schemeClr val="bg2"/>
+              </a:solidFill>
+            </a:endParaRPr>
           </a:p>
         </p:txBody>
       </p:sp>
@@ -25557,7 +25583,7 @@
         <p:spPr>
           <a:xfrm>
             <a:off x="1427000" y="1322733"/>
-            <a:ext cx="7716900" cy="5188500"/>
+            <a:ext cx="7716900" cy="4089526"/>
           </a:xfrm>
           <a:prstGeom prst="rect">
             <a:avLst/>
@@ -25584,7 +25610,7 @@
               <a:buNone/>
             </a:pPr>
             <a:r>
-              <a:rPr lang="nl-NL" sz="1900" b="1">
+              <a:rPr lang="nl-NL" sz="1900" b="1" dirty="0">
                 <a:solidFill>
                   <a:schemeClr val="dk1"/>
                 </a:solidFill>
@@ -25595,7 +25621,7 @@
               </a:rPr>
               <a:t>Input  	 </a:t>
             </a:r>
-            <a:endParaRPr sz="1900" b="1">
+            <a:endParaRPr sz="1900" b="1" dirty="0">
               <a:solidFill>
                 <a:schemeClr val="dk1"/>
               </a:solidFill>
@@ -25616,7 +25642,7 @@
               <a:buNone/>
             </a:pPr>
             <a:r>
-              <a:rPr lang="nl-NL" sz="1900" b="1">
+              <a:rPr lang="nl-NL" sz="1900" b="1" dirty="0">
                 <a:solidFill>
                   <a:schemeClr val="dk1"/>
                 </a:solidFill>
@@ -25625,9 +25651,57 @@
                 <a:cs typeface="Verdana"/>
                 <a:sym typeface="Verdana"/>
               </a:rPr>
-              <a:t>: Probability of an event i in treatment k.</a:t>
+              <a:t>: </a:t>
             </a:r>
-            <a:endParaRPr sz="1900" b="1">
+            <a:r>
+              <a:rPr lang="nl-NL" sz="1900" b="1" dirty="0" err="1">
+                <a:solidFill>
+                  <a:schemeClr val="dk1"/>
+                </a:solidFill>
+                <a:latin typeface="Verdana"/>
+                <a:ea typeface="Verdana"/>
+                <a:cs typeface="Verdana"/>
+                <a:sym typeface="Verdana"/>
+              </a:rPr>
+              <a:t>Probability</a:t>
+            </a:r>
+            <a:r>
+              <a:rPr lang="nl-NL" sz="1900" b="1" dirty="0">
+                <a:solidFill>
+                  <a:schemeClr val="dk1"/>
+                </a:solidFill>
+                <a:latin typeface="Verdana"/>
+                <a:ea typeface="Verdana"/>
+                <a:cs typeface="Verdana"/>
+                <a:sym typeface="Verdana"/>
+              </a:rPr>
+              <a:t> of </a:t>
+            </a:r>
+            <a:r>
+              <a:rPr lang="nl-NL" sz="1900" b="1" dirty="0" err="1">
+                <a:solidFill>
+                  <a:schemeClr val="dk1"/>
+                </a:solidFill>
+                <a:latin typeface="Verdana"/>
+                <a:ea typeface="Verdana"/>
+                <a:cs typeface="Verdana"/>
+                <a:sym typeface="Verdana"/>
+              </a:rPr>
+              <a:t>an</a:t>
+            </a:r>
+            <a:r>
+              <a:rPr lang="nl-NL" sz="1900" b="1" dirty="0">
+                <a:solidFill>
+                  <a:schemeClr val="dk1"/>
+                </a:solidFill>
+                <a:latin typeface="Verdana"/>
+                <a:ea typeface="Verdana"/>
+                <a:cs typeface="Verdana"/>
+                <a:sym typeface="Verdana"/>
+              </a:rPr>
+              <a:t> event i in treatment k.</a:t>
+            </a:r>
+            <a:endParaRPr sz="1900" b="1" dirty="0">
               <a:solidFill>
                 <a:schemeClr val="dk1"/>
               </a:solidFill>
@@ -25648,7 +25722,7 @@
               <a:buNone/>
             </a:pPr>
             <a:r>
-              <a:rPr lang="nl-NL" sz="1900" b="1">
+              <a:rPr lang="nl-NL" sz="1900" b="1" dirty="0">
                 <a:solidFill>
                   <a:schemeClr val="dk1"/>
                 </a:solidFill>
@@ -25657,9 +25731,81 @@
                 <a:cs typeface="Verdana"/>
                 <a:sym typeface="Verdana"/>
               </a:rPr>
-              <a:t>: Conditional probability of  event j given event i in treatment k.</a:t>
+              <a:t>: </a:t>
             </a:r>
-            <a:endParaRPr sz="1900" b="1">
+            <a:r>
+              <a:rPr lang="nl-NL" sz="1900" b="1" dirty="0" err="1">
+                <a:solidFill>
+                  <a:schemeClr val="dk1"/>
+                </a:solidFill>
+                <a:latin typeface="Verdana"/>
+                <a:ea typeface="Verdana"/>
+                <a:cs typeface="Verdana"/>
+                <a:sym typeface="Verdana"/>
+              </a:rPr>
+              <a:t>Conditional</a:t>
+            </a:r>
+            <a:r>
+              <a:rPr lang="nl-NL" sz="1900" b="1" dirty="0">
+                <a:solidFill>
+                  <a:schemeClr val="dk1"/>
+                </a:solidFill>
+                <a:latin typeface="Verdana"/>
+                <a:ea typeface="Verdana"/>
+                <a:cs typeface="Verdana"/>
+                <a:sym typeface="Verdana"/>
+              </a:rPr>
+              <a:t> </a:t>
+            </a:r>
+            <a:r>
+              <a:rPr lang="nl-NL" sz="1900" b="1" dirty="0" err="1">
+                <a:solidFill>
+                  <a:schemeClr val="dk1"/>
+                </a:solidFill>
+                <a:latin typeface="Verdana"/>
+                <a:ea typeface="Verdana"/>
+                <a:cs typeface="Verdana"/>
+                <a:sym typeface="Verdana"/>
+              </a:rPr>
+              <a:t>probability</a:t>
+            </a:r>
+            <a:r>
+              <a:rPr lang="nl-NL" sz="1900" b="1" dirty="0">
+                <a:solidFill>
+                  <a:schemeClr val="dk1"/>
+                </a:solidFill>
+                <a:latin typeface="Verdana"/>
+                <a:ea typeface="Verdana"/>
+                <a:cs typeface="Verdana"/>
+                <a:sym typeface="Verdana"/>
+              </a:rPr>
+              <a:t> of  event j </a:t>
+            </a:r>
+            <a:r>
+              <a:rPr lang="nl-NL" sz="1900" b="1" dirty="0" err="1">
+                <a:solidFill>
+                  <a:schemeClr val="dk1"/>
+                </a:solidFill>
+                <a:latin typeface="Verdana"/>
+                <a:ea typeface="Verdana"/>
+                <a:cs typeface="Verdana"/>
+                <a:sym typeface="Verdana"/>
+              </a:rPr>
+              <a:t>given</a:t>
+            </a:r>
+            <a:r>
+              <a:rPr lang="nl-NL" sz="1900" b="1" dirty="0">
+                <a:solidFill>
+                  <a:schemeClr val="dk1"/>
+                </a:solidFill>
+                <a:latin typeface="Verdana"/>
+                <a:ea typeface="Verdana"/>
+                <a:cs typeface="Verdana"/>
+                <a:sym typeface="Verdana"/>
+              </a:rPr>
+              <a:t> event i in treatment k.</a:t>
+            </a:r>
+            <a:endParaRPr sz="1900" b="1" dirty="0">
               <a:solidFill>
                 <a:schemeClr val="dk1"/>
               </a:solidFill>
@@ -25680,7 +25826,7 @@
               <a:buNone/>
             </a:pPr>
             <a:r>
-              <a:rPr lang="nl-NL" sz="1900" b="1">
+              <a:rPr lang="nl-NL" sz="1900" b="1" dirty="0">
                 <a:solidFill>
                   <a:schemeClr val="dk1"/>
                 </a:solidFill>
@@ -25689,9 +25835,177 @@
                 <a:cs typeface="Verdana"/>
                 <a:sym typeface="Verdana"/>
               </a:rPr>
-              <a:t>: Effectiveness associated with experiencing the combination of events i and j in treatment k.</a:t>
+              <a:t>: </a:t>
             </a:r>
-            <a:endParaRPr sz="1900" b="1">
+            <a:r>
+              <a:rPr lang="nl-NL" sz="1900" b="1" dirty="0" err="1">
+                <a:solidFill>
+                  <a:schemeClr val="dk1"/>
+                </a:solidFill>
+                <a:latin typeface="Verdana"/>
+                <a:ea typeface="Verdana"/>
+                <a:cs typeface="Verdana"/>
+                <a:sym typeface="Verdana"/>
+              </a:rPr>
+              <a:t>Effectiveness</a:t>
+            </a:r>
+            <a:r>
+              <a:rPr lang="nl-NL" sz="1900" b="1" dirty="0">
+                <a:solidFill>
+                  <a:schemeClr val="dk1"/>
+                </a:solidFill>
+                <a:latin typeface="Verdana"/>
+                <a:ea typeface="Verdana"/>
+                <a:cs typeface="Verdana"/>
+                <a:sym typeface="Verdana"/>
+              </a:rPr>
+              <a:t> </a:t>
+            </a:r>
+            <a:r>
+              <a:rPr lang="nl-NL" sz="1900" b="1" dirty="0" err="1">
+                <a:solidFill>
+                  <a:schemeClr val="dk1"/>
+                </a:solidFill>
+                <a:latin typeface="Verdana"/>
+                <a:ea typeface="Verdana"/>
+                <a:cs typeface="Verdana"/>
+                <a:sym typeface="Verdana"/>
+              </a:rPr>
+              <a:t>associated</a:t>
+            </a:r>
+            <a:r>
+              <a:rPr lang="nl-NL" sz="1900" b="1" dirty="0">
+                <a:solidFill>
+                  <a:schemeClr val="dk1"/>
+                </a:solidFill>
+                <a:latin typeface="Verdana"/>
+                <a:ea typeface="Verdana"/>
+                <a:cs typeface="Verdana"/>
+                <a:sym typeface="Verdana"/>
+              </a:rPr>
+              <a:t> </a:t>
+            </a:r>
+            <a:r>
+              <a:rPr lang="nl-NL" sz="1900" b="1" dirty="0" err="1">
+                <a:solidFill>
+                  <a:schemeClr val="dk1"/>
+                </a:solidFill>
+                <a:latin typeface="Verdana"/>
+                <a:ea typeface="Verdana"/>
+                <a:cs typeface="Verdana"/>
+                <a:sym typeface="Verdana"/>
+              </a:rPr>
+              <a:t>with</a:t>
+            </a:r>
+            <a:r>
+              <a:rPr lang="nl-NL" sz="1900" b="1" dirty="0">
+                <a:solidFill>
+                  <a:schemeClr val="dk1"/>
+                </a:solidFill>
+                <a:latin typeface="Verdana"/>
+                <a:ea typeface="Verdana"/>
+                <a:cs typeface="Verdana"/>
+                <a:sym typeface="Verdana"/>
+              </a:rPr>
+              <a:t> </a:t>
+            </a:r>
+            <a:r>
+              <a:rPr lang="nl-NL" sz="1900" b="1" dirty="0" err="1">
+                <a:solidFill>
+                  <a:schemeClr val="dk1"/>
+                </a:solidFill>
+                <a:latin typeface="Verdana"/>
+                <a:ea typeface="Verdana"/>
+                <a:cs typeface="Verdana"/>
+                <a:sym typeface="Verdana"/>
+              </a:rPr>
+              <a:t>experiencing</a:t>
+            </a:r>
+            <a:r>
+              <a:rPr lang="nl-NL" sz="1900" b="1" dirty="0">
+                <a:solidFill>
+                  <a:schemeClr val="dk1"/>
+                </a:solidFill>
+                <a:latin typeface="Verdana"/>
+                <a:ea typeface="Verdana"/>
+                <a:cs typeface="Verdana"/>
+                <a:sym typeface="Verdana"/>
+              </a:rPr>
+              <a:t> </a:t>
+            </a:r>
+            <a:r>
+              <a:rPr lang="nl-NL" sz="1900" b="1" dirty="0" err="1">
+                <a:solidFill>
+                  <a:schemeClr val="dk1"/>
+                </a:solidFill>
+                <a:latin typeface="Verdana"/>
+                <a:ea typeface="Verdana"/>
+                <a:cs typeface="Verdana"/>
+                <a:sym typeface="Verdana"/>
+              </a:rPr>
+              <a:t>the</a:t>
+            </a:r>
+            <a:r>
+              <a:rPr lang="nl-NL" sz="1900" b="1" dirty="0">
+                <a:solidFill>
+                  <a:schemeClr val="dk1"/>
+                </a:solidFill>
+                <a:latin typeface="Verdana"/>
+                <a:ea typeface="Verdana"/>
+                <a:cs typeface="Verdana"/>
+                <a:sym typeface="Verdana"/>
+              </a:rPr>
+              <a:t> </a:t>
+            </a:r>
+            <a:r>
+              <a:rPr lang="nl-NL" sz="1900" b="1" dirty="0" err="1">
+                <a:solidFill>
+                  <a:schemeClr val="dk1"/>
+                </a:solidFill>
+                <a:latin typeface="Verdana"/>
+                <a:ea typeface="Verdana"/>
+                <a:cs typeface="Verdana"/>
+                <a:sym typeface="Verdana"/>
+              </a:rPr>
+              <a:t>combination</a:t>
+            </a:r>
+            <a:r>
+              <a:rPr lang="nl-NL" sz="1900" b="1" dirty="0">
+                <a:solidFill>
+                  <a:schemeClr val="dk1"/>
+                </a:solidFill>
+                <a:latin typeface="Verdana"/>
+                <a:ea typeface="Verdana"/>
+                <a:cs typeface="Verdana"/>
+                <a:sym typeface="Verdana"/>
+              </a:rPr>
+              <a:t> of events i </a:t>
+            </a:r>
+            <a:r>
+              <a:rPr lang="nl-NL" sz="1900" b="1" dirty="0" err="1">
+                <a:solidFill>
+                  <a:schemeClr val="dk1"/>
+                </a:solidFill>
+                <a:latin typeface="Verdana"/>
+                <a:ea typeface="Verdana"/>
+                <a:cs typeface="Verdana"/>
+                <a:sym typeface="Verdana"/>
+              </a:rPr>
+              <a:t>and</a:t>
+            </a:r>
+            <a:r>
+              <a:rPr lang="nl-NL" sz="1900" b="1" dirty="0">
+                <a:solidFill>
+                  <a:schemeClr val="dk1"/>
+                </a:solidFill>
+                <a:latin typeface="Verdana"/>
+                <a:ea typeface="Verdana"/>
+                <a:cs typeface="Verdana"/>
+                <a:sym typeface="Verdana"/>
+              </a:rPr>
+              <a:t> j in treatment k.</a:t>
+            </a:r>
+            <a:endParaRPr sz="1900" b="1" dirty="0">
               <a:solidFill>
                 <a:schemeClr val="dk1"/>
               </a:solidFill>
@@ -25712,7 +26026,7 @@
               <a:buNone/>
             </a:pPr>
             <a:r>
-              <a:rPr lang="nl-NL" sz="1900" b="1">
+              <a:rPr lang="nl-NL" sz="1900" b="1" dirty="0">
                 <a:solidFill>
                   <a:schemeClr val="dk1"/>
                 </a:solidFill>
@@ -25721,9 +26035,177 @@
                 <a:cs typeface="Verdana"/>
                 <a:sym typeface="Verdana"/>
               </a:rPr>
-              <a:t>: Costs associated with experiencing the combination of events i and j in treatment k.</a:t>
+              <a:t>: </a:t>
             </a:r>
-            <a:endParaRPr sz="1900" b="1">
+            <a:r>
+              <a:rPr lang="nl-NL" sz="1900" b="1" dirty="0" err="1">
+                <a:solidFill>
+                  <a:schemeClr val="dk1"/>
+                </a:solidFill>
+                <a:latin typeface="Verdana"/>
+                <a:ea typeface="Verdana"/>
+                <a:cs typeface="Verdana"/>
+                <a:sym typeface="Verdana"/>
+              </a:rPr>
+              <a:t>Costs</a:t>
+            </a:r>
+            <a:r>
+              <a:rPr lang="nl-NL" sz="1900" b="1" dirty="0">
+                <a:solidFill>
+                  <a:schemeClr val="dk1"/>
+                </a:solidFill>
+                <a:latin typeface="Verdana"/>
+                <a:ea typeface="Verdana"/>
+                <a:cs typeface="Verdana"/>
+                <a:sym typeface="Verdana"/>
+              </a:rPr>
+              <a:t> </a:t>
+            </a:r>
+            <a:r>
+              <a:rPr lang="nl-NL" sz="1900" b="1" dirty="0" err="1">
+                <a:solidFill>
+                  <a:schemeClr val="dk1"/>
+                </a:solidFill>
+                <a:latin typeface="Verdana"/>
+                <a:ea typeface="Verdana"/>
+                <a:cs typeface="Verdana"/>
+                <a:sym typeface="Verdana"/>
+              </a:rPr>
+              <a:t>associated</a:t>
+            </a:r>
+            <a:r>
+              <a:rPr lang="nl-NL" sz="1900" b="1" dirty="0">
+                <a:solidFill>
+                  <a:schemeClr val="dk1"/>
+                </a:solidFill>
+                <a:latin typeface="Verdana"/>
+                <a:ea typeface="Verdana"/>
+                <a:cs typeface="Verdana"/>
+                <a:sym typeface="Verdana"/>
+              </a:rPr>
+              <a:t> </a:t>
+            </a:r>
+            <a:r>
+              <a:rPr lang="nl-NL" sz="1900" b="1" dirty="0" err="1">
+                <a:solidFill>
+                  <a:schemeClr val="dk1"/>
+                </a:solidFill>
+                <a:latin typeface="Verdana"/>
+                <a:ea typeface="Verdana"/>
+                <a:cs typeface="Verdana"/>
+                <a:sym typeface="Verdana"/>
+              </a:rPr>
+              <a:t>with</a:t>
+            </a:r>
+            <a:r>
+              <a:rPr lang="nl-NL" sz="1900" b="1" dirty="0">
+                <a:solidFill>
+                  <a:schemeClr val="dk1"/>
+                </a:solidFill>
+                <a:latin typeface="Verdana"/>
+                <a:ea typeface="Verdana"/>
+                <a:cs typeface="Verdana"/>
+                <a:sym typeface="Verdana"/>
+              </a:rPr>
+              <a:t> </a:t>
+            </a:r>
+            <a:r>
+              <a:rPr lang="nl-NL" sz="1900" b="1" dirty="0" err="1">
+                <a:solidFill>
+                  <a:schemeClr val="dk1"/>
+                </a:solidFill>
+                <a:latin typeface="Verdana"/>
+                <a:ea typeface="Verdana"/>
+                <a:cs typeface="Verdana"/>
+                <a:sym typeface="Verdana"/>
+              </a:rPr>
+              <a:t>experiencing</a:t>
+            </a:r>
+            <a:r>
+              <a:rPr lang="nl-NL" sz="1900" b="1" dirty="0">
+                <a:solidFill>
+                  <a:schemeClr val="dk1"/>
+                </a:solidFill>
+                <a:latin typeface="Verdana"/>
+                <a:ea typeface="Verdana"/>
+                <a:cs typeface="Verdana"/>
+                <a:sym typeface="Verdana"/>
+              </a:rPr>
+              <a:t> </a:t>
+            </a:r>
+            <a:r>
+              <a:rPr lang="nl-NL" sz="1900" b="1" dirty="0" err="1">
+                <a:solidFill>
+                  <a:schemeClr val="dk1"/>
+                </a:solidFill>
+                <a:latin typeface="Verdana"/>
+                <a:ea typeface="Verdana"/>
+                <a:cs typeface="Verdana"/>
+                <a:sym typeface="Verdana"/>
+              </a:rPr>
+              <a:t>the</a:t>
+            </a:r>
+            <a:r>
+              <a:rPr lang="nl-NL" sz="1900" b="1" dirty="0">
+                <a:solidFill>
+                  <a:schemeClr val="dk1"/>
+                </a:solidFill>
+                <a:latin typeface="Verdana"/>
+                <a:ea typeface="Verdana"/>
+                <a:cs typeface="Verdana"/>
+                <a:sym typeface="Verdana"/>
+              </a:rPr>
+              <a:t> </a:t>
+            </a:r>
+            <a:r>
+              <a:rPr lang="nl-NL" sz="1900" b="1" dirty="0" err="1">
+                <a:solidFill>
+                  <a:schemeClr val="dk1"/>
+                </a:solidFill>
+                <a:latin typeface="Verdana"/>
+                <a:ea typeface="Verdana"/>
+                <a:cs typeface="Verdana"/>
+                <a:sym typeface="Verdana"/>
+              </a:rPr>
+              <a:t>combination</a:t>
+            </a:r>
+            <a:r>
+              <a:rPr lang="nl-NL" sz="1900" b="1" dirty="0">
+                <a:solidFill>
+                  <a:schemeClr val="dk1"/>
+                </a:solidFill>
+                <a:latin typeface="Verdana"/>
+                <a:ea typeface="Verdana"/>
+                <a:cs typeface="Verdana"/>
+                <a:sym typeface="Verdana"/>
+              </a:rPr>
+              <a:t> of events i </a:t>
+            </a:r>
+            <a:r>
+              <a:rPr lang="nl-NL" sz="1900" b="1" dirty="0" err="1">
+                <a:solidFill>
+                  <a:schemeClr val="dk1"/>
+                </a:solidFill>
+                <a:latin typeface="Verdana"/>
+                <a:ea typeface="Verdana"/>
+                <a:cs typeface="Verdana"/>
+                <a:sym typeface="Verdana"/>
+              </a:rPr>
+              <a:t>and</a:t>
+            </a:r>
+            <a:r>
+              <a:rPr lang="nl-NL" sz="1900" b="1" dirty="0">
+                <a:solidFill>
+                  <a:schemeClr val="dk1"/>
+                </a:solidFill>
+                <a:latin typeface="Verdana"/>
+                <a:ea typeface="Verdana"/>
+                <a:cs typeface="Verdana"/>
+                <a:sym typeface="Verdana"/>
+              </a:rPr>
+              <a:t> j in treatment k.</a:t>
+            </a:r>
+            <a:endParaRPr sz="1900" b="1" dirty="0">
               <a:solidFill>
                 <a:schemeClr val="dk1"/>
               </a:solidFill>
@@ -25743,7 +26225,7 @@
               </a:spcAft>
               <a:buNone/>
             </a:pPr>
-            <a:endParaRPr sz="1900" b="1">
+            <a:endParaRPr sz="1900" b="1" dirty="0">
               <a:solidFill>
                 <a:schemeClr val="dk1"/>
               </a:solidFill>
@@ -25832,7 +26314,7 @@
         </p:blipFill>
         <p:spPr>
           <a:xfrm>
-            <a:off x="2685450" y="4636167"/>
+            <a:off x="2685450" y="4940968"/>
             <a:ext cx="3366425" cy="1829200"/>
           </a:xfrm>
           <a:prstGeom prst="rect">
@@ -25921,7 +26403,7 @@
               <a:buNone/>
             </a:pPr>
             <a:r>
-              <a:rPr lang="nl-NL" sz="1900" b="1">
+              <a:rPr lang="nl-NL" sz="1900" b="1" dirty="0" err="1">
                 <a:solidFill>
                   <a:schemeClr val="dk1"/>
                 </a:solidFill>
@@ -25930,9 +26412,345 @@
                 <a:cs typeface="Verdana"/>
                 <a:sym typeface="Verdana"/>
               </a:rPr>
-              <a:t>Initialize TE , TC   the vectors containing the total effectiveness and costs for all k strategies</a:t>
+              <a:t>Initialize</a:t>
             </a:r>
-            <a:endParaRPr sz="1900" b="1">
+            <a:r>
+              <a:rPr lang="nl-NL" sz="1900" b="1" dirty="0">
+                <a:solidFill>
+                  <a:schemeClr val="dk1"/>
+                </a:solidFill>
+                <a:latin typeface="Verdana"/>
+                <a:ea typeface="Verdana"/>
+                <a:cs typeface="Verdana"/>
+                <a:sym typeface="Verdana"/>
+              </a:rPr>
+              <a:t> </a:t>
+            </a:r>
+            <a:r>
+              <a:rPr lang="nl-NL" sz="1900" b="1" dirty="0" err="1">
+                <a:solidFill>
+                  <a:schemeClr val="dk1"/>
+                </a:solidFill>
+                <a:latin typeface="Verdana"/>
+                <a:ea typeface="Verdana"/>
+                <a:cs typeface="Verdana"/>
+                <a:sym typeface="Verdana"/>
+              </a:rPr>
+              <a:t>total</a:t>
+            </a:r>
+            <a:r>
+              <a:rPr lang="nl-NL" sz="1900" b="1" dirty="0">
+                <a:solidFill>
+                  <a:schemeClr val="dk1"/>
+                </a:solidFill>
+                <a:latin typeface="Verdana"/>
+                <a:ea typeface="Verdana"/>
+                <a:cs typeface="Verdana"/>
+                <a:sym typeface="Verdana"/>
+              </a:rPr>
+              <a:t> </a:t>
+            </a:r>
+            <a:r>
+              <a:rPr lang="nl-NL" sz="1900" b="1" dirty="0" err="1">
+                <a:solidFill>
+                  <a:schemeClr val="dk1"/>
+                </a:solidFill>
+                <a:latin typeface="Verdana"/>
+                <a:ea typeface="Verdana"/>
+                <a:cs typeface="Verdana"/>
+                <a:sym typeface="Verdana"/>
+              </a:rPr>
+              <a:t>effects</a:t>
+            </a:r>
+            <a:r>
+              <a:rPr lang="nl-NL" sz="1900" b="1" dirty="0">
+                <a:solidFill>
+                  <a:schemeClr val="dk1"/>
+                </a:solidFill>
+                <a:latin typeface="Verdana"/>
+                <a:ea typeface="Verdana"/>
+                <a:cs typeface="Verdana"/>
+                <a:sym typeface="Verdana"/>
+              </a:rPr>
+              <a:t> (TE), </a:t>
+            </a:r>
+            <a:r>
+              <a:rPr lang="nl-NL" sz="1900" b="1" dirty="0" err="1">
+                <a:solidFill>
+                  <a:schemeClr val="dk1"/>
+                </a:solidFill>
+                <a:latin typeface="Verdana"/>
+                <a:ea typeface="Verdana"/>
+                <a:cs typeface="Verdana"/>
+                <a:sym typeface="Verdana"/>
+              </a:rPr>
+              <a:t>total</a:t>
+            </a:r>
+            <a:r>
+              <a:rPr lang="nl-NL" sz="1900" b="1" dirty="0">
+                <a:solidFill>
+                  <a:schemeClr val="dk1"/>
+                </a:solidFill>
+                <a:latin typeface="Verdana"/>
+                <a:ea typeface="Verdana"/>
+                <a:cs typeface="Verdana"/>
+                <a:sym typeface="Verdana"/>
+              </a:rPr>
+              <a:t> </a:t>
+            </a:r>
+            <a:r>
+              <a:rPr lang="nl-NL" sz="1900" b="1" dirty="0" err="1">
+                <a:solidFill>
+                  <a:schemeClr val="dk1"/>
+                </a:solidFill>
+                <a:latin typeface="Verdana"/>
+                <a:ea typeface="Verdana"/>
+                <a:cs typeface="Verdana"/>
+                <a:sym typeface="Verdana"/>
+              </a:rPr>
+              <a:t>costs</a:t>
+            </a:r>
+            <a:r>
+              <a:rPr lang="nl-NL" sz="1900" b="1" dirty="0">
+                <a:solidFill>
+                  <a:schemeClr val="dk1"/>
+                </a:solidFill>
+                <a:latin typeface="Verdana"/>
+                <a:ea typeface="Verdana"/>
+                <a:cs typeface="Verdana"/>
+                <a:sym typeface="Verdana"/>
+              </a:rPr>
+              <a:t> (TC) </a:t>
+            </a:r>
+            <a:r>
+              <a:rPr lang="nl-NL" sz="1900" b="1" dirty="0" err="1">
+                <a:solidFill>
+                  <a:schemeClr val="dk1"/>
+                </a:solidFill>
+                <a:latin typeface="Verdana"/>
+                <a:ea typeface="Verdana"/>
+                <a:cs typeface="Verdana"/>
+                <a:sym typeface="Verdana"/>
+              </a:rPr>
+              <a:t>vectors</a:t>
+            </a:r>
+            <a:r>
+              <a:rPr lang="nl-NL" sz="1900" b="1" dirty="0">
+                <a:solidFill>
+                  <a:schemeClr val="dk1"/>
+                </a:solidFill>
+                <a:latin typeface="Verdana"/>
+                <a:ea typeface="Verdana"/>
+                <a:cs typeface="Verdana"/>
+                <a:sym typeface="Verdana"/>
+              </a:rPr>
+              <a:t> </a:t>
+            </a:r>
+            <a:r>
+              <a:rPr lang="nl-NL" sz="1900" b="1" dirty="0" err="1">
+                <a:solidFill>
+                  <a:schemeClr val="dk1"/>
+                </a:solidFill>
+                <a:latin typeface="Verdana"/>
+                <a:ea typeface="Verdana"/>
+                <a:cs typeface="Verdana"/>
+                <a:sym typeface="Verdana"/>
+              </a:rPr>
+              <a:t>containing</a:t>
+            </a:r>
+            <a:r>
+              <a:rPr lang="nl-NL" sz="1900" b="1" dirty="0">
+                <a:solidFill>
+                  <a:schemeClr val="dk1"/>
+                </a:solidFill>
+                <a:latin typeface="Verdana"/>
+                <a:ea typeface="Verdana"/>
+                <a:cs typeface="Verdana"/>
+                <a:sym typeface="Verdana"/>
+              </a:rPr>
+              <a:t> </a:t>
+            </a:r>
+            <a:r>
+              <a:rPr lang="nl-NL" sz="1900" b="1" dirty="0" err="1">
+                <a:solidFill>
+                  <a:schemeClr val="dk1"/>
+                </a:solidFill>
+                <a:latin typeface="Verdana"/>
+                <a:ea typeface="Verdana"/>
+                <a:cs typeface="Verdana"/>
+                <a:sym typeface="Verdana"/>
+              </a:rPr>
+              <a:t>the</a:t>
+            </a:r>
+            <a:r>
+              <a:rPr lang="nl-NL" sz="1900" b="1" dirty="0">
+                <a:solidFill>
+                  <a:schemeClr val="dk1"/>
+                </a:solidFill>
+                <a:latin typeface="Verdana"/>
+                <a:ea typeface="Verdana"/>
+                <a:cs typeface="Verdana"/>
+                <a:sym typeface="Verdana"/>
+              </a:rPr>
+              <a:t> </a:t>
+            </a:r>
+            <a:r>
+              <a:rPr lang="nl-NL" sz="1900" b="1" dirty="0" err="1">
+                <a:solidFill>
+                  <a:schemeClr val="dk1"/>
+                </a:solidFill>
+                <a:latin typeface="Verdana"/>
+                <a:ea typeface="Verdana"/>
+                <a:cs typeface="Verdana"/>
+                <a:sym typeface="Verdana"/>
+              </a:rPr>
+              <a:t>total</a:t>
+            </a:r>
+            <a:r>
+              <a:rPr lang="nl-NL" sz="1900" b="1" dirty="0">
+                <a:solidFill>
+                  <a:schemeClr val="dk1"/>
+                </a:solidFill>
+                <a:latin typeface="Verdana"/>
+                <a:ea typeface="Verdana"/>
+                <a:cs typeface="Verdana"/>
+                <a:sym typeface="Verdana"/>
+              </a:rPr>
+              <a:t> </a:t>
+            </a:r>
+            <a:r>
+              <a:rPr lang="nl-NL" sz="1900" b="1" dirty="0" err="1">
+                <a:solidFill>
+                  <a:schemeClr val="dk1"/>
+                </a:solidFill>
+                <a:latin typeface="Verdana"/>
+                <a:ea typeface="Verdana"/>
+                <a:cs typeface="Verdana"/>
+                <a:sym typeface="Verdana"/>
+              </a:rPr>
+              <a:t>effectiveness</a:t>
+            </a:r>
+            <a:r>
+              <a:rPr lang="nl-NL" sz="1900" b="1" dirty="0">
+                <a:solidFill>
+                  <a:schemeClr val="dk1"/>
+                </a:solidFill>
+                <a:latin typeface="Verdana"/>
+                <a:ea typeface="Verdana"/>
+                <a:cs typeface="Verdana"/>
+                <a:sym typeface="Verdana"/>
+              </a:rPr>
+              <a:t> </a:t>
+            </a:r>
+            <a:r>
+              <a:rPr lang="nl-NL" sz="1900" b="1" dirty="0" err="1">
+                <a:solidFill>
+                  <a:schemeClr val="dk1"/>
+                </a:solidFill>
+                <a:latin typeface="Verdana"/>
+                <a:ea typeface="Verdana"/>
+                <a:cs typeface="Verdana"/>
+                <a:sym typeface="Verdana"/>
+              </a:rPr>
+              <a:t>and</a:t>
+            </a:r>
+            <a:r>
+              <a:rPr lang="nl-NL" sz="1900" b="1" dirty="0">
+                <a:solidFill>
+                  <a:schemeClr val="dk1"/>
+                </a:solidFill>
+                <a:latin typeface="Verdana"/>
+                <a:ea typeface="Verdana"/>
+                <a:cs typeface="Verdana"/>
+                <a:sym typeface="Verdana"/>
+              </a:rPr>
+              <a:t> </a:t>
+            </a:r>
+            <a:r>
+              <a:rPr lang="nl-NL" sz="1900" b="1" dirty="0" err="1">
+                <a:solidFill>
+                  <a:schemeClr val="dk1"/>
+                </a:solidFill>
+                <a:latin typeface="Verdana"/>
+                <a:ea typeface="Verdana"/>
+                <a:cs typeface="Verdana"/>
+                <a:sym typeface="Verdana"/>
+              </a:rPr>
+              <a:t>costs</a:t>
+            </a:r>
+            <a:r>
+              <a:rPr lang="nl-NL" sz="1900" b="1" dirty="0">
+                <a:solidFill>
+                  <a:schemeClr val="dk1"/>
+                </a:solidFill>
+                <a:latin typeface="Verdana"/>
+                <a:ea typeface="Verdana"/>
+                <a:cs typeface="Verdana"/>
+                <a:sym typeface="Verdana"/>
+              </a:rPr>
+              <a:t> </a:t>
+            </a:r>
+            <a:r>
+              <a:rPr lang="nl-NL" sz="1900" b="1" dirty="0" err="1">
+                <a:solidFill>
+                  <a:schemeClr val="dk1"/>
+                </a:solidFill>
+                <a:latin typeface="Verdana"/>
+                <a:ea typeface="Verdana"/>
+                <a:cs typeface="Verdana"/>
+                <a:sym typeface="Verdana"/>
+              </a:rPr>
+              <a:t>for</a:t>
+            </a:r>
+            <a:r>
+              <a:rPr lang="nl-NL" sz="1900" b="1" dirty="0">
+                <a:solidFill>
+                  <a:schemeClr val="dk1"/>
+                </a:solidFill>
+                <a:latin typeface="Verdana"/>
+                <a:ea typeface="Verdana"/>
+                <a:cs typeface="Verdana"/>
+                <a:sym typeface="Verdana"/>
+              </a:rPr>
+              <a:t> </a:t>
+            </a:r>
+            <a:r>
+              <a:rPr lang="nl-NL" sz="1900" b="1" dirty="0" err="1">
+                <a:solidFill>
+                  <a:schemeClr val="dk1"/>
+                </a:solidFill>
+                <a:latin typeface="Verdana"/>
+                <a:ea typeface="Verdana"/>
+                <a:cs typeface="Verdana"/>
+                <a:sym typeface="Verdana"/>
+              </a:rPr>
+              <a:t>all</a:t>
+            </a:r>
+            <a:r>
+              <a:rPr lang="nl-NL" sz="1900" b="1" dirty="0">
+                <a:solidFill>
+                  <a:schemeClr val="dk1"/>
+                </a:solidFill>
+                <a:latin typeface="Verdana"/>
+                <a:ea typeface="Verdana"/>
+                <a:cs typeface="Verdana"/>
+                <a:sym typeface="Verdana"/>
+              </a:rPr>
+              <a:t> k </a:t>
+            </a:r>
+            <a:r>
+              <a:rPr lang="nl-NL" sz="1900" b="1" dirty="0" err="1">
+                <a:solidFill>
+                  <a:schemeClr val="dk1"/>
+                </a:solidFill>
+                <a:latin typeface="Verdana"/>
+                <a:ea typeface="Verdana"/>
+                <a:cs typeface="Verdana"/>
+                <a:sym typeface="Verdana"/>
+              </a:rPr>
+              <a:t>strategies</a:t>
+            </a:r>
+            <a:endParaRPr sz="1900" b="1" dirty="0">
               <a:solidFill>
                 <a:schemeClr val="dk1"/>
               </a:solidFill>
@@ -25953,7 +26771,7 @@
               <a:buNone/>
             </a:pPr>
             <a:r>
-              <a:rPr lang="nl-NL" sz="1900" b="1">
+              <a:rPr lang="nl-NL" sz="1900" b="1" dirty="0">
                 <a:solidFill>
                   <a:schemeClr val="dk1"/>
                 </a:solidFill>
@@ -25962,9 +26780,309 @@
                 <a:cs typeface="Verdana"/>
                 <a:sym typeface="Verdana"/>
               </a:rPr>
-              <a:t>The expected effectiveness and cost for each intervention can be described with one single equation</a:t>
+              <a:t>The </a:t>
             </a:r>
-            <a:endParaRPr sz="1900" b="1">
+            <a:r>
+              <a:rPr lang="nl-NL" sz="1900" b="1" dirty="0" err="1">
+                <a:solidFill>
+                  <a:schemeClr val="dk1"/>
+                </a:solidFill>
+                <a:latin typeface="Verdana"/>
+                <a:ea typeface="Verdana"/>
+                <a:cs typeface="Verdana"/>
+                <a:sym typeface="Verdana"/>
+              </a:rPr>
+              <a:t>expected</a:t>
+            </a:r>
+            <a:r>
+              <a:rPr lang="nl-NL" sz="1900" b="1" dirty="0">
+                <a:solidFill>
+                  <a:schemeClr val="dk1"/>
+                </a:solidFill>
+                <a:latin typeface="Verdana"/>
+                <a:ea typeface="Verdana"/>
+                <a:cs typeface="Verdana"/>
+                <a:sym typeface="Verdana"/>
+              </a:rPr>
+              <a:t> </a:t>
+            </a:r>
+            <a:r>
+              <a:rPr lang="nl-NL" sz="1900" b="1" dirty="0" err="1">
+                <a:solidFill>
+                  <a:schemeClr val="dk1"/>
+                </a:solidFill>
+                <a:latin typeface="Verdana"/>
+                <a:ea typeface="Verdana"/>
+                <a:cs typeface="Verdana"/>
+                <a:sym typeface="Verdana"/>
+              </a:rPr>
+              <a:t>effectiveness</a:t>
+            </a:r>
+            <a:r>
+              <a:rPr lang="nl-NL" sz="1900" b="1" dirty="0">
+                <a:solidFill>
+                  <a:schemeClr val="dk1"/>
+                </a:solidFill>
+                <a:latin typeface="Verdana"/>
+                <a:ea typeface="Verdana"/>
+                <a:cs typeface="Verdana"/>
+                <a:sym typeface="Verdana"/>
+              </a:rPr>
+              <a:t> </a:t>
+            </a:r>
+            <a:r>
+              <a:rPr lang="nl-NL" sz="1900" b="1" dirty="0" err="1">
+                <a:solidFill>
+                  <a:schemeClr val="dk1"/>
+                </a:solidFill>
+                <a:latin typeface="Verdana"/>
+                <a:ea typeface="Verdana"/>
+                <a:cs typeface="Verdana"/>
+                <a:sym typeface="Verdana"/>
+              </a:rPr>
+              <a:t>and</a:t>
+            </a:r>
+            <a:r>
+              <a:rPr lang="nl-NL" sz="1900" b="1" dirty="0">
+                <a:solidFill>
+                  <a:schemeClr val="dk1"/>
+                </a:solidFill>
+                <a:latin typeface="Verdana"/>
+                <a:ea typeface="Verdana"/>
+                <a:cs typeface="Verdana"/>
+                <a:sym typeface="Verdana"/>
+              </a:rPr>
+              <a:t> </a:t>
+            </a:r>
+            <a:r>
+              <a:rPr lang="nl-NL" sz="1900" b="1" dirty="0" err="1">
+                <a:solidFill>
+                  <a:schemeClr val="dk1"/>
+                </a:solidFill>
+                <a:latin typeface="Verdana"/>
+                <a:ea typeface="Verdana"/>
+                <a:cs typeface="Verdana"/>
+                <a:sym typeface="Verdana"/>
+              </a:rPr>
+              <a:t>cost</a:t>
+            </a:r>
+            <a:r>
+              <a:rPr lang="nl-NL" sz="1900" b="1" dirty="0">
+                <a:solidFill>
+                  <a:schemeClr val="dk1"/>
+                </a:solidFill>
+                <a:latin typeface="Verdana"/>
+                <a:ea typeface="Verdana"/>
+                <a:cs typeface="Verdana"/>
+                <a:sym typeface="Verdana"/>
+              </a:rPr>
+              <a:t> </a:t>
+            </a:r>
+            <a:r>
+              <a:rPr lang="nl-NL" sz="1900" b="1" dirty="0" err="1">
+                <a:solidFill>
+                  <a:schemeClr val="dk1"/>
+                </a:solidFill>
+                <a:latin typeface="Verdana"/>
+                <a:ea typeface="Verdana"/>
+                <a:cs typeface="Verdana"/>
+                <a:sym typeface="Verdana"/>
+              </a:rPr>
+              <a:t>for</a:t>
+            </a:r>
+            <a:r>
+              <a:rPr lang="nl-NL" sz="1900" b="1" dirty="0">
+                <a:solidFill>
+                  <a:schemeClr val="dk1"/>
+                </a:solidFill>
+                <a:latin typeface="Verdana"/>
+                <a:ea typeface="Verdana"/>
+                <a:cs typeface="Verdana"/>
+                <a:sym typeface="Verdana"/>
+              </a:rPr>
+              <a:t> </a:t>
+            </a:r>
+            <a:r>
+              <a:rPr lang="nl-NL" sz="1900" b="1" dirty="0" err="1">
+                <a:solidFill>
+                  <a:schemeClr val="dk1"/>
+                </a:solidFill>
+                <a:latin typeface="Verdana"/>
+                <a:ea typeface="Verdana"/>
+                <a:cs typeface="Verdana"/>
+                <a:sym typeface="Verdana"/>
+              </a:rPr>
+              <a:t>each</a:t>
+            </a:r>
+            <a:r>
+              <a:rPr lang="nl-NL" sz="1900" b="1" dirty="0">
+                <a:solidFill>
+                  <a:schemeClr val="dk1"/>
+                </a:solidFill>
+                <a:latin typeface="Verdana"/>
+                <a:ea typeface="Verdana"/>
+                <a:cs typeface="Verdana"/>
+                <a:sym typeface="Verdana"/>
+              </a:rPr>
+              <a:t> </a:t>
+            </a:r>
+            <a:r>
+              <a:rPr lang="nl-NL" sz="1900" b="1" dirty="0" err="1">
+                <a:solidFill>
+                  <a:schemeClr val="dk1"/>
+                </a:solidFill>
+                <a:latin typeface="Verdana"/>
+                <a:ea typeface="Verdana"/>
+                <a:cs typeface="Verdana"/>
+                <a:sym typeface="Verdana"/>
+              </a:rPr>
+              <a:t>intervention</a:t>
+            </a:r>
+            <a:r>
+              <a:rPr lang="nl-NL" sz="1900" b="1" dirty="0">
+                <a:solidFill>
+                  <a:schemeClr val="dk1"/>
+                </a:solidFill>
+                <a:latin typeface="Verdana"/>
+                <a:ea typeface="Verdana"/>
+                <a:cs typeface="Verdana"/>
+                <a:sym typeface="Verdana"/>
+              </a:rPr>
+              <a:t> </a:t>
+            </a:r>
+            <a:r>
+              <a:rPr lang="nl-NL" sz="1900" b="1" dirty="0" err="1">
+                <a:solidFill>
+                  <a:schemeClr val="dk1"/>
+                </a:solidFill>
+                <a:latin typeface="Verdana"/>
+                <a:ea typeface="Verdana"/>
+                <a:cs typeface="Verdana"/>
+                <a:sym typeface="Verdana"/>
+              </a:rPr>
+              <a:t>can</a:t>
+            </a:r>
+            <a:r>
+              <a:rPr lang="nl-NL" sz="1900" b="1" dirty="0">
+                <a:solidFill>
+                  <a:schemeClr val="dk1"/>
+                </a:solidFill>
+                <a:latin typeface="Verdana"/>
+                <a:ea typeface="Verdana"/>
+                <a:cs typeface="Verdana"/>
+                <a:sym typeface="Verdana"/>
+              </a:rPr>
+              <a:t> </a:t>
+            </a:r>
+            <a:r>
+              <a:rPr lang="nl-NL" sz="1900" b="1" dirty="0" err="1">
+                <a:solidFill>
+                  <a:schemeClr val="dk1"/>
+                </a:solidFill>
+                <a:latin typeface="Verdana"/>
+                <a:ea typeface="Verdana"/>
+                <a:cs typeface="Verdana"/>
+                <a:sym typeface="Verdana"/>
+              </a:rPr>
+              <a:t>be</a:t>
+            </a:r>
+            <a:r>
+              <a:rPr lang="nl-NL" sz="1900" b="1" dirty="0">
+                <a:solidFill>
+                  <a:schemeClr val="dk1"/>
+                </a:solidFill>
+                <a:latin typeface="Verdana"/>
+                <a:ea typeface="Verdana"/>
+                <a:cs typeface="Verdana"/>
+                <a:sym typeface="Verdana"/>
+              </a:rPr>
+              <a:t> </a:t>
+            </a:r>
+            <a:r>
+              <a:rPr lang="nl-NL" sz="1900" b="1" dirty="0" err="1">
+                <a:solidFill>
+                  <a:schemeClr val="dk1"/>
+                </a:solidFill>
+                <a:latin typeface="Verdana"/>
+                <a:ea typeface="Verdana"/>
+                <a:cs typeface="Verdana"/>
+                <a:sym typeface="Verdana"/>
+              </a:rPr>
+              <a:t>described</a:t>
+            </a:r>
+            <a:r>
+              <a:rPr lang="nl-NL" sz="1900" b="1" dirty="0">
+                <a:solidFill>
+                  <a:schemeClr val="dk1"/>
+                </a:solidFill>
+                <a:latin typeface="Verdana"/>
+                <a:ea typeface="Verdana"/>
+                <a:cs typeface="Verdana"/>
+                <a:sym typeface="Verdana"/>
+              </a:rPr>
+              <a:t> </a:t>
+            </a:r>
+            <a:r>
+              <a:rPr lang="nl-NL" sz="1900" b="1" dirty="0" err="1">
+                <a:solidFill>
+                  <a:schemeClr val="dk1"/>
+                </a:solidFill>
+                <a:latin typeface="Verdana"/>
+                <a:ea typeface="Verdana"/>
+                <a:cs typeface="Verdana"/>
+                <a:sym typeface="Verdana"/>
+              </a:rPr>
+              <a:t>with</a:t>
+            </a:r>
+            <a:r>
+              <a:rPr lang="nl-NL" sz="1900" b="1" dirty="0">
+                <a:solidFill>
+                  <a:schemeClr val="dk1"/>
+                </a:solidFill>
+                <a:latin typeface="Verdana"/>
+                <a:ea typeface="Verdana"/>
+                <a:cs typeface="Verdana"/>
+                <a:sym typeface="Verdana"/>
+              </a:rPr>
+              <a:t> </a:t>
+            </a:r>
+            <a:r>
+              <a:rPr lang="nl-NL" sz="1900" b="1" dirty="0" err="1">
+                <a:solidFill>
+                  <a:schemeClr val="dk1"/>
+                </a:solidFill>
+                <a:latin typeface="Verdana"/>
+                <a:ea typeface="Verdana"/>
+                <a:cs typeface="Verdana"/>
+                <a:sym typeface="Verdana"/>
+              </a:rPr>
+              <a:t>one</a:t>
+            </a:r>
+            <a:r>
+              <a:rPr lang="nl-NL" sz="1900" b="1" dirty="0">
+                <a:solidFill>
+                  <a:schemeClr val="dk1"/>
+                </a:solidFill>
+                <a:latin typeface="Verdana"/>
+                <a:ea typeface="Verdana"/>
+                <a:cs typeface="Verdana"/>
+                <a:sym typeface="Verdana"/>
+              </a:rPr>
+              <a:t> single </a:t>
+            </a:r>
+            <a:r>
+              <a:rPr lang="nl-NL" sz="1900" b="1" dirty="0" err="1">
+                <a:solidFill>
+                  <a:schemeClr val="dk1"/>
+                </a:solidFill>
+                <a:latin typeface="Verdana"/>
+                <a:ea typeface="Verdana"/>
+                <a:cs typeface="Verdana"/>
+                <a:sym typeface="Verdana"/>
+              </a:rPr>
+              <a:t>equation</a:t>
+            </a:r>
+            <a:endParaRPr sz="1900" b="1" dirty="0">
               <a:solidFill>
                 <a:schemeClr val="dk1"/>
               </a:solidFill>
@@ -25984,7 +27102,7 @@
               </a:spcAft>
               <a:buNone/>
             </a:pPr>
-            <a:endParaRPr sz="1900" b="1">
+            <a:endParaRPr sz="1900" b="1" dirty="0">
               <a:solidFill>
                 <a:schemeClr val="dk1"/>
               </a:solidFill>
@@ -26004,7 +27122,7 @@
               </a:spcAft>
               <a:buNone/>
             </a:pPr>
-            <a:endParaRPr sz="1900" b="1">
+            <a:endParaRPr sz="1900" b="1" dirty="0">
               <a:solidFill>
                 <a:schemeClr val="dk1"/>
               </a:solidFill>
@@ -26126,7 +27244,7 @@
               <a:buNone/>
             </a:pPr>
             <a:r>
-              <a:rPr lang="nl-NL" sz="1900" b="1">
+              <a:rPr lang="nl-NL" sz="1900" b="1" dirty="0">
                 <a:solidFill>
                   <a:schemeClr val="dk1"/>
                 </a:solidFill>
@@ -26137,7 +27255,7 @@
               </a:rPr>
               <a:t>Output</a:t>
             </a:r>
-            <a:endParaRPr sz="1900" b="1">
+            <a:endParaRPr sz="1900" b="1" dirty="0">
               <a:solidFill>
                 <a:schemeClr val="dk1"/>
               </a:solidFill>
@@ -26158,7 +27276,7 @@
               <a:buNone/>
             </a:pPr>
             <a:r>
-              <a:rPr lang="nl-NL" sz="1900" b="1">
+              <a:rPr lang="nl-NL" sz="1900" b="1" dirty="0" err="1">
                 <a:solidFill>
                   <a:schemeClr val="dk1"/>
                 </a:solidFill>
@@ -26167,10 +27285,58 @@
                 <a:cs typeface="Verdana"/>
                 <a:sym typeface="Verdana"/>
               </a:rPr>
-              <a:t>Incremental  Costs:      ΔC</a:t>
+              <a:t>Incremental</a:t>
             </a:r>
             <a:r>
-              <a:rPr lang="nl-NL" sz="1900" b="1" baseline="-25000">
+              <a:rPr lang="nl-NL" sz="1900" b="1" dirty="0">
+                <a:solidFill>
+                  <a:schemeClr val="dk1"/>
+                </a:solidFill>
+                <a:latin typeface="Verdana"/>
+                <a:ea typeface="Verdana"/>
+                <a:cs typeface="Verdana"/>
+                <a:sym typeface="Verdana"/>
+              </a:rPr>
+              <a:t>  </a:t>
+            </a:r>
+            <a:r>
+              <a:rPr lang="nl-NL" sz="1900" b="1" dirty="0" err="1">
+                <a:solidFill>
+                  <a:schemeClr val="dk1"/>
+                </a:solidFill>
+                <a:latin typeface="Verdana"/>
+                <a:ea typeface="Verdana"/>
+                <a:cs typeface="Verdana"/>
+                <a:sym typeface="Verdana"/>
+              </a:rPr>
+              <a:t>Costs</a:t>
+            </a:r>
+            <a:r>
+              <a:rPr lang="nl-NL" sz="1900" b="1" dirty="0">
+                <a:solidFill>
+                  <a:schemeClr val="dk1"/>
+                </a:solidFill>
+                <a:latin typeface="Verdana"/>
+                <a:ea typeface="Verdana"/>
+                <a:cs typeface="Verdana"/>
+                <a:sym typeface="Verdana"/>
+              </a:rPr>
+              <a:t>:       </a:t>
+            </a:r>
+            <a:r>
+              <a:rPr lang="nl-NL" sz="1900" b="1" dirty="0" err="1">
+                <a:solidFill>
+                  <a:schemeClr val="dk1"/>
+                </a:solidFill>
+                <a:latin typeface="Verdana"/>
+                <a:ea typeface="Verdana"/>
+                <a:cs typeface="Verdana"/>
+                <a:sym typeface="Verdana"/>
+              </a:rPr>
+              <a:t>ΔC</a:t>
+            </a:r>
+            <a:r>
+              <a:rPr lang="nl-NL" sz="1900" b="1" baseline="-25000" dirty="0" err="1">
                 <a:solidFill>
                   <a:schemeClr val="dk1"/>
                 </a:solidFill>
@@ -26182,7 +27348,7 @@
               <a:t>kl</a:t>
             </a:r>
             <a:r>
-              <a:rPr lang="nl-NL" sz="1900" b="1">
+              <a:rPr lang="nl-NL" sz="1900" b="1" dirty="0">
                 <a:solidFill>
                   <a:schemeClr val="dk1"/>
                 </a:solidFill>
@@ -26191,10 +27357,22 @@
                 <a:cs typeface="Verdana"/>
                 <a:sym typeface="Verdana"/>
               </a:rPr>
-              <a:t>  =  TC</a:t>
+              <a:t> =  </a:t>
             </a:r>
             <a:r>
-              <a:rPr lang="nl-NL" sz="1900" b="1" baseline="-25000">
+              <a:rPr lang="nl-NL" sz="1900" b="1" dirty="0" err="1">
+                <a:solidFill>
+                  <a:schemeClr val="dk1"/>
+                </a:solidFill>
+                <a:latin typeface="Verdana"/>
+                <a:ea typeface="Verdana"/>
+                <a:cs typeface="Verdana"/>
+                <a:sym typeface="Verdana"/>
+              </a:rPr>
+              <a:t>TC</a:t>
+            </a:r>
+            <a:r>
+              <a:rPr lang="nl-NL" sz="1900" b="1" baseline="-25000" dirty="0" err="1">
                 <a:solidFill>
                   <a:schemeClr val="dk1"/>
                 </a:solidFill>
@@ -26206,7 +27384,7 @@
               <a:t>l</a:t>
             </a:r>
             <a:r>
-              <a:rPr lang="nl-NL" sz="1900" b="1">
+              <a:rPr lang="nl-NL" sz="1900" b="1" dirty="0">
                 <a:solidFill>
                   <a:schemeClr val="dk1"/>
                 </a:solidFill>
@@ -26215,10 +27393,22 @@
                 <a:cs typeface="Verdana"/>
                 <a:sym typeface="Verdana"/>
               </a:rPr>
-              <a:t>  –  TC</a:t>
+              <a:t>  –  </a:t>
             </a:r>
             <a:r>
-              <a:rPr lang="nl-NL" sz="1900" b="1" baseline="-25000">
+              <a:rPr lang="nl-NL" sz="1900" b="1" dirty="0" err="1">
+                <a:solidFill>
+                  <a:schemeClr val="dk1"/>
+                </a:solidFill>
+                <a:latin typeface="Verdana"/>
+                <a:ea typeface="Verdana"/>
+                <a:cs typeface="Verdana"/>
+                <a:sym typeface="Verdana"/>
+              </a:rPr>
+              <a:t>TC</a:t>
+            </a:r>
+            <a:r>
+              <a:rPr lang="nl-NL" sz="1900" b="1" baseline="-25000" dirty="0" err="1">
                 <a:solidFill>
                   <a:schemeClr val="dk1"/>
                 </a:solidFill>
@@ -26229,7 +27419,7 @@
               </a:rPr>
               <a:t>k</a:t>
             </a:r>
-            <a:endParaRPr sz="1900" b="1" baseline="-25000">
+            <a:endParaRPr sz="1900" b="1" baseline="-25000" dirty="0">
               <a:solidFill>
                 <a:schemeClr val="dk1"/>
               </a:solidFill>
@@ -26250,7 +27440,7 @@
               <a:buNone/>
             </a:pPr>
             <a:r>
-              <a:rPr lang="nl-NL" sz="1900" b="1">
+              <a:rPr lang="nl-NL" sz="1900" b="1" dirty="0" err="1">
                 <a:solidFill>
                   <a:schemeClr val="dk1"/>
                 </a:solidFill>
@@ -26259,10 +27449,58 @@
                 <a:cs typeface="Verdana"/>
                 <a:sym typeface="Verdana"/>
               </a:rPr>
-              <a:t>Incremental  Effects:     ΔΕ</a:t>
+              <a:t>Incremental</a:t>
             </a:r>
             <a:r>
-              <a:rPr lang="nl-NL" sz="1900" b="1" baseline="-25000">
+              <a:rPr lang="nl-NL" sz="1900" b="1" dirty="0">
+                <a:solidFill>
+                  <a:schemeClr val="dk1"/>
+                </a:solidFill>
+                <a:latin typeface="Verdana"/>
+                <a:ea typeface="Verdana"/>
+                <a:cs typeface="Verdana"/>
+                <a:sym typeface="Verdana"/>
+              </a:rPr>
+              <a:t>  </a:t>
+            </a:r>
+            <a:r>
+              <a:rPr lang="nl-NL" sz="1900" b="1" dirty="0" err="1">
+                <a:solidFill>
+                  <a:schemeClr val="dk1"/>
+                </a:solidFill>
+                <a:latin typeface="Verdana"/>
+                <a:ea typeface="Verdana"/>
+                <a:cs typeface="Verdana"/>
+                <a:sym typeface="Verdana"/>
+              </a:rPr>
+              <a:t>Effects</a:t>
+            </a:r>
+            <a:r>
+              <a:rPr lang="nl-NL" sz="1900" b="1" dirty="0">
+                <a:solidFill>
+                  <a:schemeClr val="dk1"/>
+                </a:solidFill>
+                <a:latin typeface="Verdana"/>
+                <a:ea typeface="Verdana"/>
+                <a:cs typeface="Verdana"/>
+                <a:sym typeface="Verdana"/>
+              </a:rPr>
+              <a:t>:     </a:t>
+            </a:r>
+            <a:r>
+              <a:rPr lang="nl-NL" sz="1900" b="1" dirty="0" err="1">
+                <a:solidFill>
+                  <a:schemeClr val="dk1"/>
+                </a:solidFill>
+                <a:latin typeface="Verdana"/>
+                <a:ea typeface="Verdana"/>
+                <a:cs typeface="Verdana"/>
+                <a:sym typeface="Verdana"/>
+              </a:rPr>
+              <a:t>ΔΕ</a:t>
+            </a:r>
+            <a:r>
+              <a:rPr lang="nl-NL" sz="1900" b="1" baseline="-25000" dirty="0" err="1">
                 <a:solidFill>
                   <a:schemeClr val="dk1"/>
                 </a:solidFill>
@@ -26274,7 +27512,7 @@
               <a:t>kl</a:t>
             </a:r>
             <a:r>
-              <a:rPr lang="nl-NL" sz="1900" b="1">
+              <a:rPr lang="nl-NL" sz="1900" b="1" dirty="0">
                 <a:solidFill>
                   <a:schemeClr val="dk1"/>
                 </a:solidFill>
@@ -26283,10 +27521,22 @@
                 <a:cs typeface="Verdana"/>
                 <a:sym typeface="Verdana"/>
               </a:rPr>
-              <a:t> =  TE</a:t>
+              <a:t> =  </a:t>
             </a:r>
             <a:r>
-              <a:rPr lang="nl-NL" sz="1900" b="1" baseline="-25000">
+              <a:rPr lang="nl-NL" sz="1900" b="1" dirty="0" err="1">
+                <a:solidFill>
+                  <a:schemeClr val="dk1"/>
+                </a:solidFill>
+                <a:latin typeface="Verdana"/>
+                <a:ea typeface="Verdana"/>
+                <a:cs typeface="Verdana"/>
+                <a:sym typeface="Verdana"/>
+              </a:rPr>
+              <a:t>TE</a:t>
+            </a:r>
+            <a:r>
+              <a:rPr lang="nl-NL" sz="1900" b="1" baseline="-25000" dirty="0" err="1">
                 <a:solidFill>
                   <a:schemeClr val="dk1"/>
                 </a:solidFill>
@@ -26298,7 +27548,7 @@
               <a:t>l</a:t>
             </a:r>
             <a:r>
-              <a:rPr lang="nl-NL" sz="1900" b="1">
+              <a:rPr lang="nl-NL" sz="1900" b="1" dirty="0">
                 <a:solidFill>
                   <a:schemeClr val="dk1"/>
                 </a:solidFill>
@@ -26307,10 +27557,22 @@
                 <a:cs typeface="Verdana"/>
                 <a:sym typeface="Verdana"/>
               </a:rPr>
-              <a:t>   –  TE</a:t>
+              <a:t>   –  </a:t>
             </a:r>
             <a:r>
-              <a:rPr lang="nl-NL" sz="1900" b="1" baseline="-25000">
+              <a:rPr lang="nl-NL" sz="1900" b="1" dirty="0" err="1">
+                <a:solidFill>
+                  <a:schemeClr val="dk1"/>
+                </a:solidFill>
+                <a:latin typeface="Verdana"/>
+                <a:ea typeface="Verdana"/>
+                <a:cs typeface="Verdana"/>
+                <a:sym typeface="Verdana"/>
+              </a:rPr>
+              <a:t>TE</a:t>
+            </a:r>
+            <a:r>
+              <a:rPr lang="nl-NL" sz="1900" b="1" baseline="-25000" dirty="0" err="1">
                 <a:solidFill>
                   <a:schemeClr val="dk1"/>
                 </a:solidFill>
@@ -26321,7 +27583,7 @@
               </a:rPr>
               <a:t>k</a:t>
             </a:r>
-            <a:endParaRPr sz="1900" b="1" baseline="-25000">
+            <a:endParaRPr sz="1900" b="1" baseline="-25000" dirty="0">
               <a:solidFill>
                 <a:schemeClr val="dk1"/>
               </a:solidFill>
@@ -26342,7 +27604,7 @@
               <a:buNone/>
             </a:pPr>
             <a:r>
-              <a:rPr lang="nl-NL" sz="1900" b="1">
+              <a:rPr lang="nl-NL" sz="1900" b="1" dirty="0" err="1">
                 <a:solidFill>
                   <a:schemeClr val="dk1"/>
                 </a:solidFill>
@@ -26351,9 +27613,69 @@
                 <a:cs typeface="Verdana"/>
                 <a:sym typeface="Verdana"/>
               </a:rPr>
-              <a:t>Incremental Cost Effectiveness Ratio:</a:t>
+              <a:t>Incremental</a:t>
             </a:r>
-            <a:endParaRPr sz="1900" b="1">
+            <a:r>
+              <a:rPr lang="nl-NL" sz="1900" b="1" dirty="0">
+                <a:solidFill>
+                  <a:schemeClr val="dk1"/>
+                </a:solidFill>
+                <a:latin typeface="Verdana"/>
+                <a:ea typeface="Verdana"/>
+                <a:cs typeface="Verdana"/>
+                <a:sym typeface="Verdana"/>
+              </a:rPr>
+              <a:t> </a:t>
+            </a:r>
+            <a:r>
+              <a:rPr lang="nl-NL" sz="1900" b="1" dirty="0" err="1">
+                <a:solidFill>
+                  <a:schemeClr val="dk1"/>
+                </a:solidFill>
+                <a:latin typeface="Verdana"/>
+                <a:ea typeface="Verdana"/>
+                <a:cs typeface="Verdana"/>
+                <a:sym typeface="Verdana"/>
+              </a:rPr>
+              <a:t>Cost</a:t>
+            </a:r>
+            <a:r>
+              <a:rPr lang="nl-NL" sz="1900" b="1" dirty="0">
+                <a:solidFill>
+                  <a:schemeClr val="dk1"/>
+                </a:solidFill>
+                <a:latin typeface="Verdana"/>
+                <a:ea typeface="Verdana"/>
+                <a:cs typeface="Verdana"/>
+                <a:sym typeface="Verdana"/>
+              </a:rPr>
+              <a:t> </a:t>
+            </a:r>
+            <a:r>
+              <a:rPr lang="nl-NL" sz="1900" b="1" dirty="0" err="1">
+                <a:solidFill>
+                  <a:schemeClr val="dk1"/>
+                </a:solidFill>
+                <a:latin typeface="Verdana"/>
+                <a:ea typeface="Verdana"/>
+                <a:cs typeface="Verdana"/>
+                <a:sym typeface="Verdana"/>
+              </a:rPr>
+              <a:t>Effectiveness</a:t>
+            </a:r>
+            <a:r>
+              <a:rPr lang="nl-NL" sz="1900" b="1" dirty="0">
+                <a:solidFill>
+                  <a:schemeClr val="dk1"/>
+                </a:solidFill>
+                <a:latin typeface="Verdana"/>
+                <a:ea typeface="Verdana"/>
+                <a:cs typeface="Verdana"/>
+                <a:sym typeface="Verdana"/>
+              </a:rPr>
+              <a:t> Ratio:</a:t>
+            </a:r>
+            <a:endParaRPr sz="1900" b="1" dirty="0">
               <a:solidFill>
                 <a:schemeClr val="dk1"/>
               </a:solidFill>
@@ -26373,7 +27695,7 @@
               </a:spcAft>
               <a:buNone/>
             </a:pPr>
-            <a:endParaRPr sz="800" b="1">
+            <a:endParaRPr sz="800" b="1" dirty="0">
               <a:solidFill>
                 <a:schemeClr val="dk1"/>
               </a:solidFill>
@@ -26393,7 +27715,7 @@
               </a:spcAft>
               <a:buNone/>
             </a:pPr>
-            <a:endParaRPr sz="800" b="1">
+            <a:endParaRPr sz="800" b="1" dirty="0">
               <a:solidFill>
                 <a:schemeClr val="dk1"/>
               </a:solidFill>
@@ -26413,7 +27735,7 @@
               </a:spcAft>
               <a:buNone/>
             </a:pPr>
-            <a:endParaRPr sz="800" b="1">
+            <a:endParaRPr sz="800" b="1" dirty="0">
               <a:solidFill>
                 <a:schemeClr val="dk1"/>
               </a:solidFill>
@@ -26434,7 +27756,7 @@
               <a:buNone/>
             </a:pPr>
             <a:r>
-              <a:rPr lang="nl-NL" sz="2600">
+              <a:rPr lang="nl-NL" sz="2600" dirty="0" err="1">
                 <a:solidFill>
                   <a:srgbClr val="000000"/>
                 </a:solidFill>
@@ -26446,7 +27768,7 @@
               <a:t>ICER</a:t>
             </a:r>
             <a:r>
-              <a:rPr lang="nl-NL" sz="4200" baseline="-25000">
+              <a:rPr lang="nl-NL" sz="4200" baseline="-25000" dirty="0" err="1">
                 <a:solidFill>
                   <a:srgbClr val="000000"/>
                 </a:solidFill>
@@ -26455,10 +27777,22 @@
                 <a:cs typeface="Verdana"/>
                 <a:sym typeface="Verdana"/>
               </a:rPr>
-              <a:t>kl </a:t>
+              <a:t>kl</a:t>
             </a:r>
             <a:r>
-              <a:rPr lang="nl-NL" sz="3500">
+              <a:rPr lang="nl-NL" sz="4200" baseline="-25000" dirty="0">
+                <a:solidFill>
+                  <a:srgbClr val="000000"/>
+                </a:solidFill>
+                <a:latin typeface="Verdana"/>
+                <a:ea typeface="Verdana"/>
+                <a:cs typeface="Verdana"/>
+                <a:sym typeface="Verdana"/>
+              </a:rPr>
+              <a:t> </a:t>
+            </a:r>
+            <a:r>
+              <a:rPr lang="nl-NL" sz="3500" dirty="0">
                 <a:solidFill>
                   <a:srgbClr val="000000"/>
                 </a:solidFill>
@@ -26470,7 +27804,7 @@
               <a:t>=</a:t>
             </a:r>
             <a:r>
-              <a:rPr lang="nl-NL" sz="4000" baseline="-25000">
+              <a:rPr lang="nl-NL" sz="4000" baseline="-25000" dirty="0">
                 <a:solidFill>
                   <a:srgbClr val="000000"/>
                 </a:solidFill>
@@ -26482,7 +27816,7 @@
               <a:t>   </a:t>
             </a:r>
             <a:r>
-              <a:rPr lang="nl-NL" sz="2000">
+              <a:rPr lang="nl-NL" sz="2000" dirty="0">
                 <a:solidFill>
                   <a:srgbClr val="000000"/>
                 </a:solidFill>
@@ -26493,7 +27827,7 @@
               </a:rPr>
               <a:t>   </a:t>
             </a:r>
-            <a:endParaRPr sz="2000">
+            <a:endParaRPr sz="2000" dirty="0">
               <a:solidFill>
                 <a:srgbClr val="000000"/>
               </a:solidFill>
@@ -26513,7 +27847,7 @@
               </a:spcAft>
               <a:buNone/>
             </a:pPr>
-            <a:endParaRPr sz="2000">
+            <a:endParaRPr sz="2000" dirty="0">
               <a:solidFill>
                 <a:srgbClr val="000000"/>
               </a:solidFill>
@@ -26534,7 +27868,7 @@
               <a:buNone/>
             </a:pPr>
             <a:r>
-              <a:rPr lang="nl-NL">
+              <a:rPr lang="nl-NL" dirty="0" err="1">
                 <a:solidFill>
                   <a:srgbClr val="000000"/>
                 </a:solidFill>
@@ -26543,9 +27877,165 @@
                 <a:cs typeface="Verdana"/>
                 <a:sym typeface="Verdana"/>
               </a:rPr>
-              <a:t>Create graphical representations of the results (CE planes etc)</a:t>
+              <a:t>Create</a:t>
             </a:r>
-            <a:endParaRPr>
+            <a:r>
+              <a:rPr lang="nl-NL" dirty="0">
+                <a:solidFill>
+                  <a:srgbClr val="000000"/>
+                </a:solidFill>
+                <a:latin typeface="Verdana"/>
+                <a:ea typeface="Verdana"/>
+                <a:cs typeface="Verdana"/>
+                <a:sym typeface="Verdana"/>
+              </a:rPr>
+              <a:t> </a:t>
+            </a:r>
+            <a:r>
+              <a:rPr lang="nl-NL" dirty="0" err="1">
+                <a:solidFill>
+                  <a:srgbClr val="000000"/>
+                </a:solidFill>
+                <a:latin typeface="Verdana"/>
+                <a:ea typeface="Verdana"/>
+                <a:cs typeface="Verdana"/>
+                <a:sym typeface="Verdana"/>
+              </a:rPr>
+              <a:t>graphical</a:t>
+            </a:r>
+            <a:r>
+              <a:rPr lang="nl-NL" dirty="0">
+                <a:solidFill>
+                  <a:srgbClr val="000000"/>
+                </a:solidFill>
+                <a:latin typeface="Verdana"/>
+                <a:ea typeface="Verdana"/>
+                <a:cs typeface="Verdana"/>
+                <a:sym typeface="Verdana"/>
+              </a:rPr>
+              <a:t> </a:t>
+            </a:r>
+            <a:r>
+              <a:rPr lang="nl-NL" dirty="0" err="1">
+                <a:solidFill>
+                  <a:srgbClr val="000000"/>
+                </a:solidFill>
+                <a:latin typeface="Verdana"/>
+                <a:ea typeface="Verdana"/>
+                <a:cs typeface="Verdana"/>
+                <a:sym typeface="Verdana"/>
+              </a:rPr>
+              <a:t>representations</a:t>
+            </a:r>
+            <a:r>
+              <a:rPr lang="nl-NL" dirty="0">
+                <a:solidFill>
+                  <a:srgbClr val="000000"/>
+                </a:solidFill>
+                <a:latin typeface="Verdana"/>
+                <a:ea typeface="Verdana"/>
+                <a:cs typeface="Verdana"/>
+                <a:sym typeface="Verdana"/>
+              </a:rPr>
+              <a:t> of </a:t>
+            </a:r>
+            <a:r>
+              <a:rPr lang="nl-NL" dirty="0" err="1">
+                <a:solidFill>
+                  <a:srgbClr val="000000"/>
+                </a:solidFill>
+                <a:latin typeface="Verdana"/>
+                <a:ea typeface="Verdana"/>
+                <a:cs typeface="Verdana"/>
+                <a:sym typeface="Verdana"/>
+              </a:rPr>
+              <a:t>the</a:t>
+            </a:r>
+            <a:r>
+              <a:rPr lang="nl-NL" dirty="0">
+                <a:solidFill>
+                  <a:srgbClr val="000000"/>
+                </a:solidFill>
+                <a:latin typeface="Verdana"/>
+                <a:ea typeface="Verdana"/>
+                <a:cs typeface="Verdana"/>
+                <a:sym typeface="Verdana"/>
+              </a:rPr>
+              <a:t> </a:t>
+            </a:r>
+            <a:r>
+              <a:rPr lang="nl-NL" dirty="0" err="1">
+                <a:solidFill>
+                  <a:srgbClr val="000000"/>
+                </a:solidFill>
+                <a:latin typeface="Verdana"/>
+                <a:ea typeface="Verdana"/>
+                <a:cs typeface="Verdana"/>
+                <a:sym typeface="Verdana"/>
+              </a:rPr>
+              <a:t>results</a:t>
+            </a:r>
+            <a:r>
+              <a:rPr lang="nl-NL" dirty="0">
+                <a:solidFill>
+                  <a:srgbClr val="000000"/>
+                </a:solidFill>
+                <a:latin typeface="Verdana"/>
+                <a:ea typeface="Verdana"/>
+                <a:cs typeface="Verdana"/>
+                <a:sym typeface="Verdana"/>
+              </a:rPr>
+              <a:t> (CE </a:t>
+            </a:r>
+            <a:r>
+              <a:rPr lang="nl-NL" dirty="0" err="1">
+                <a:solidFill>
+                  <a:srgbClr val="000000"/>
+                </a:solidFill>
+                <a:latin typeface="Verdana"/>
+                <a:ea typeface="Verdana"/>
+                <a:cs typeface="Verdana"/>
+                <a:sym typeface="Verdana"/>
+              </a:rPr>
+              <a:t>planes</a:t>
+            </a:r>
+            <a:r>
+              <a:rPr lang="nl-NL" dirty="0">
+                <a:solidFill>
+                  <a:srgbClr val="000000"/>
+                </a:solidFill>
+                <a:latin typeface="Verdana"/>
+                <a:ea typeface="Verdana"/>
+                <a:cs typeface="Verdana"/>
+                <a:sym typeface="Verdana"/>
+              </a:rPr>
+              <a:t> </a:t>
+            </a:r>
+            <a:r>
+              <a:rPr lang="nl-NL" dirty="0" err="1">
+                <a:solidFill>
+                  <a:srgbClr val="000000"/>
+                </a:solidFill>
+                <a:latin typeface="Verdana"/>
+                <a:ea typeface="Verdana"/>
+                <a:cs typeface="Verdana"/>
+                <a:sym typeface="Verdana"/>
+              </a:rPr>
+              <a:t>etc</a:t>
+            </a:r>
+            <a:r>
+              <a:rPr lang="nl-NL" dirty="0">
+                <a:solidFill>
+                  <a:srgbClr val="000000"/>
+                </a:solidFill>
+                <a:latin typeface="Verdana"/>
+                <a:ea typeface="Verdana"/>
+                <a:cs typeface="Verdana"/>
+                <a:sym typeface="Verdana"/>
+              </a:rPr>
+              <a:t>)</a:t>
+            </a:r>
+            <a:endParaRPr dirty="0">
               <a:solidFill>
                 <a:srgbClr val="000000"/>
               </a:solidFill>
@@ -26565,7 +28055,7 @@
               </a:spcAft>
               <a:buNone/>
             </a:pPr>
-            <a:endParaRPr sz="1900" b="1">
+            <a:endParaRPr sz="1900" b="1" dirty="0">
               <a:solidFill>
                 <a:srgbClr val="000000"/>
               </a:solidFill>
@@ -26715,7 +28205,7 @@
               <a:buNone/>
             </a:pPr>
             <a:r>
-              <a:rPr lang="nl-NL" sz="1900" b="1">
+              <a:rPr lang="nl-NL" sz="1900" b="1" dirty="0" err="1">
                 <a:solidFill>
                   <a:schemeClr val="dk1"/>
                 </a:solidFill>
@@ -26724,9 +28214,261 @@
                 <a:cs typeface="Verdana"/>
                 <a:sym typeface="Verdana"/>
               </a:rPr>
-              <a:t>Estimating the cost-effectiveness of three follow-up practices for colorectal cancer after colorectal cancer treatment (Gray et al, 2011).</a:t>
+              <a:t>Estimating</a:t>
             </a:r>
-            <a:endParaRPr sz="1900" b="1">
+            <a:r>
+              <a:rPr lang="nl-NL" sz="1900" b="1" dirty="0">
+                <a:solidFill>
+                  <a:schemeClr val="dk1"/>
+                </a:solidFill>
+                <a:latin typeface="Verdana"/>
+                <a:ea typeface="Verdana"/>
+                <a:cs typeface="Verdana"/>
+                <a:sym typeface="Verdana"/>
+              </a:rPr>
+              <a:t> </a:t>
+            </a:r>
+            <a:r>
+              <a:rPr lang="nl-NL" sz="1900" b="1" dirty="0" err="1">
+                <a:solidFill>
+                  <a:schemeClr val="dk1"/>
+                </a:solidFill>
+                <a:latin typeface="Verdana"/>
+                <a:ea typeface="Verdana"/>
+                <a:cs typeface="Verdana"/>
+                <a:sym typeface="Verdana"/>
+              </a:rPr>
+              <a:t>the</a:t>
+            </a:r>
+            <a:r>
+              <a:rPr lang="nl-NL" sz="1900" b="1" dirty="0">
+                <a:solidFill>
+                  <a:schemeClr val="dk1"/>
+                </a:solidFill>
+                <a:latin typeface="Verdana"/>
+                <a:ea typeface="Verdana"/>
+                <a:cs typeface="Verdana"/>
+                <a:sym typeface="Verdana"/>
+              </a:rPr>
+              <a:t> </a:t>
+            </a:r>
+            <a:r>
+              <a:rPr lang="nl-NL" sz="1900" b="1" dirty="0" err="1">
+                <a:solidFill>
+                  <a:schemeClr val="dk1"/>
+                </a:solidFill>
+                <a:latin typeface="Verdana"/>
+                <a:ea typeface="Verdana"/>
+                <a:cs typeface="Verdana"/>
+                <a:sym typeface="Verdana"/>
+              </a:rPr>
+              <a:t>cost-effectiveness</a:t>
+            </a:r>
+            <a:r>
+              <a:rPr lang="nl-NL" sz="1900" b="1" dirty="0">
+                <a:solidFill>
+                  <a:schemeClr val="dk1"/>
+                </a:solidFill>
+                <a:latin typeface="Verdana"/>
+                <a:ea typeface="Verdana"/>
+                <a:cs typeface="Verdana"/>
+                <a:sym typeface="Verdana"/>
+              </a:rPr>
+              <a:t> of </a:t>
+            </a:r>
+            <a:r>
+              <a:rPr lang="nl-NL" sz="1900" b="1" dirty="0" err="1">
+                <a:solidFill>
+                  <a:schemeClr val="dk1"/>
+                </a:solidFill>
+                <a:latin typeface="Verdana"/>
+                <a:ea typeface="Verdana"/>
+                <a:cs typeface="Verdana"/>
+                <a:sym typeface="Verdana"/>
+              </a:rPr>
+              <a:t>three</a:t>
+            </a:r>
+            <a:r>
+              <a:rPr lang="nl-NL" sz="1900" b="1" dirty="0">
+                <a:solidFill>
+                  <a:schemeClr val="dk1"/>
+                </a:solidFill>
+                <a:latin typeface="Verdana"/>
+                <a:ea typeface="Verdana"/>
+                <a:cs typeface="Verdana"/>
+                <a:sym typeface="Verdana"/>
+              </a:rPr>
+              <a:t> follow-up </a:t>
+            </a:r>
+            <a:r>
+              <a:rPr lang="nl-NL" sz="1900" b="1" dirty="0" err="1">
+                <a:solidFill>
+                  <a:schemeClr val="dk1"/>
+                </a:solidFill>
+                <a:latin typeface="Verdana"/>
+                <a:ea typeface="Verdana"/>
+                <a:cs typeface="Verdana"/>
+                <a:sym typeface="Verdana"/>
+              </a:rPr>
+              <a:t>practices</a:t>
+            </a:r>
+            <a:r>
+              <a:rPr lang="nl-NL" sz="1900" b="1" dirty="0">
+                <a:solidFill>
+                  <a:schemeClr val="dk1"/>
+                </a:solidFill>
+                <a:latin typeface="Verdana"/>
+                <a:ea typeface="Verdana"/>
+                <a:cs typeface="Verdana"/>
+                <a:sym typeface="Verdana"/>
+              </a:rPr>
+              <a:t> </a:t>
+            </a:r>
+            <a:r>
+              <a:rPr lang="nl-NL" sz="1900" b="1" dirty="0" err="1">
+                <a:solidFill>
+                  <a:schemeClr val="dk1"/>
+                </a:solidFill>
+                <a:latin typeface="Verdana"/>
+                <a:ea typeface="Verdana"/>
+                <a:cs typeface="Verdana"/>
+                <a:sym typeface="Verdana"/>
+              </a:rPr>
+              <a:t>for</a:t>
+            </a:r>
+            <a:r>
+              <a:rPr lang="nl-NL" sz="1900" b="1" dirty="0">
+                <a:solidFill>
+                  <a:schemeClr val="dk1"/>
+                </a:solidFill>
+                <a:latin typeface="Verdana"/>
+                <a:ea typeface="Verdana"/>
+                <a:cs typeface="Verdana"/>
+                <a:sym typeface="Verdana"/>
+              </a:rPr>
+              <a:t> </a:t>
+            </a:r>
+            <a:r>
+              <a:rPr lang="nl-NL" sz="1900" b="1" dirty="0" err="1">
+                <a:solidFill>
+                  <a:schemeClr val="dk1"/>
+                </a:solidFill>
+                <a:latin typeface="Verdana"/>
+                <a:ea typeface="Verdana"/>
+                <a:cs typeface="Verdana"/>
+                <a:sym typeface="Verdana"/>
+              </a:rPr>
+              <a:t>colorectal</a:t>
+            </a:r>
+            <a:r>
+              <a:rPr lang="nl-NL" sz="1900" b="1" dirty="0">
+                <a:solidFill>
+                  <a:schemeClr val="dk1"/>
+                </a:solidFill>
+                <a:latin typeface="Verdana"/>
+                <a:ea typeface="Verdana"/>
+                <a:cs typeface="Verdana"/>
+                <a:sym typeface="Verdana"/>
+              </a:rPr>
+              <a:t> </a:t>
+            </a:r>
+            <a:r>
+              <a:rPr lang="nl-NL" sz="1900" b="1" dirty="0" err="1">
+                <a:solidFill>
+                  <a:schemeClr val="dk1"/>
+                </a:solidFill>
+                <a:latin typeface="Verdana"/>
+                <a:ea typeface="Verdana"/>
+                <a:cs typeface="Verdana"/>
+                <a:sym typeface="Verdana"/>
+              </a:rPr>
+              <a:t>cancer</a:t>
+            </a:r>
+            <a:r>
+              <a:rPr lang="nl-NL" sz="1900" b="1" dirty="0">
+                <a:solidFill>
+                  <a:schemeClr val="dk1"/>
+                </a:solidFill>
+                <a:latin typeface="Verdana"/>
+                <a:ea typeface="Verdana"/>
+                <a:cs typeface="Verdana"/>
+                <a:sym typeface="Verdana"/>
+              </a:rPr>
+              <a:t> </a:t>
+            </a:r>
+            <a:r>
+              <a:rPr lang="nl-NL" sz="1900" b="1" dirty="0" err="1">
+                <a:solidFill>
+                  <a:schemeClr val="dk1"/>
+                </a:solidFill>
+                <a:latin typeface="Verdana"/>
+                <a:ea typeface="Verdana"/>
+                <a:cs typeface="Verdana"/>
+                <a:sym typeface="Verdana"/>
+              </a:rPr>
+              <a:t>after</a:t>
+            </a:r>
+            <a:r>
+              <a:rPr lang="nl-NL" sz="1900" b="1" dirty="0">
+                <a:solidFill>
+                  <a:schemeClr val="dk1"/>
+                </a:solidFill>
+                <a:latin typeface="Verdana"/>
+                <a:ea typeface="Verdana"/>
+                <a:cs typeface="Verdana"/>
+                <a:sym typeface="Verdana"/>
+              </a:rPr>
+              <a:t> </a:t>
+            </a:r>
+            <a:r>
+              <a:rPr lang="nl-NL" sz="1900" b="1" dirty="0" err="1">
+                <a:solidFill>
+                  <a:schemeClr val="dk1"/>
+                </a:solidFill>
+                <a:latin typeface="Verdana"/>
+                <a:ea typeface="Verdana"/>
+                <a:cs typeface="Verdana"/>
+                <a:sym typeface="Verdana"/>
+              </a:rPr>
+              <a:t>colorectal</a:t>
+            </a:r>
+            <a:r>
+              <a:rPr lang="nl-NL" sz="1900" b="1" dirty="0">
+                <a:solidFill>
+                  <a:schemeClr val="dk1"/>
+                </a:solidFill>
+                <a:latin typeface="Verdana"/>
+                <a:ea typeface="Verdana"/>
+                <a:cs typeface="Verdana"/>
+                <a:sym typeface="Verdana"/>
+              </a:rPr>
+              <a:t> </a:t>
+            </a:r>
+            <a:r>
+              <a:rPr lang="nl-NL" sz="1900" b="1" dirty="0" err="1">
+                <a:solidFill>
+                  <a:schemeClr val="dk1"/>
+                </a:solidFill>
+                <a:latin typeface="Verdana"/>
+                <a:ea typeface="Verdana"/>
+                <a:cs typeface="Verdana"/>
+                <a:sym typeface="Verdana"/>
+              </a:rPr>
+              <a:t>cancer</a:t>
+            </a:r>
+            <a:r>
+              <a:rPr lang="nl-NL" sz="1900" b="1" dirty="0">
+                <a:solidFill>
+                  <a:schemeClr val="dk1"/>
+                </a:solidFill>
+                <a:latin typeface="Verdana"/>
+                <a:ea typeface="Verdana"/>
+                <a:cs typeface="Verdana"/>
+                <a:sym typeface="Verdana"/>
+              </a:rPr>
+              <a:t> treatment (Gray et al, 2011).</a:t>
+            </a:r>
+            <a:endParaRPr sz="1900" b="1" dirty="0">
               <a:solidFill>
                 <a:schemeClr val="dk1"/>
               </a:solidFill>
@@ -26752,7 +28494,7 @@
               <a:buChar char="●"/>
             </a:pPr>
             <a:r>
-              <a:rPr lang="nl-NL" sz="1900" b="1">
+              <a:rPr lang="nl-NL" sz="1900" b="1" dirty="0">
                 <a:solidFill>
                   <a:schemeClr val="dk1"/>
                 </a:solidFill>
@@ -26761,9 +28503,33 @@
                 <a:cs typeface="Verdana"/>
                 <a:sym typeface="Verdana"/>
               </a:rPr>
-              <a:t>Follow-up in primary care (PC),</a:t>
+              <a:t>Follow-up in </a:t>
             </a:r>
-            <a:endParaRPr sz="1900" b="1">
+            <a:r>
+              <a:rPr lang="nl-NL" sz="1900" b="1" dirty="0" err="1">
+                <a:solidFill>
+                  <a:schemeClr val="dk1"/>
+                </a:solidFill>
+                <a:latin typeface="Verdana"/>
+                <a:ea typeface="Verdana"/>
+                <a:cs typeface="Verdana"/>
+                <a:sym typeface="Verdana"/>
+              </a:rPr>
+              <a:t>primary</a:t>
+            </a:r>
+            <a:r>
+              <a:rPr lang="nl-NL" sz="1900" b="1" dirty="0">
+                <a:solidFill>
+                  <a:schemeClr val="dk1"/>
+                </a:solidFill>
+                <a:latin typeface="Verdana"/>
+                <a:ea typeface="Verdana"/>
+                <a:cs typeface="Verdana"/>
+                <a:sym typeface="Verdana"/>
+              </a:rPr>
+              <a:t> care (PC),</a:t>
+            </a:r>
+            <a:endParaRPr sz="1900" b="1" dirty="0">
               <a:solidFill>
                 <a:schemeClr val="dk1"/>
               </a:solidFill>
@@ -26789,7 +28555,7 @@
               <a:buChar char="●"/>
             </a:pPr>
             <a:r>
-              <a:rPr lang="nl-NL" sz="1900" b="1">
+              <a:rPr lang="nl-NL" sz="1900" b="1" dirty="0">
                 <a:solidFill>
                   <a:schemeClr val="dk1"/>
                 </a:solidFill>
@@ -26798,9 +28564,33 @@
                 <a:cs typeface="Verdana"/>
                 <a:sym typeface="Verdana"/>
               </a:rPr>
-              <a:t>Follow-up in hospital care (HC) or</a:t>
+              <a:t>Follow-up in </a:t>
             </a:r>
-            <a:endParaRPr sz="1900" b="1">
+            <a:r>
+              <a:rPr lang="nl-NL" sz="1900" b="1" dirty="0" err="1">
+                <a:solidFill>
+                  <a:schemeClr val="dk1"/>
+                </a:solidFill>
+                <a:latin typeface="Verdana"/>
+                <a:ea typeface="Verdana"/>
+                <a:cs typeface="Verdana"/>
+                <a:sym typeface="Verdana"/>
+              </a:rPr>
+              <a:t>hospital</a:t>
+            </a:r>
+            <a:r>
+              <a:rPr lang="nl-NL" sz="1900" b="1" dirty="0">
+                <a:solidFill>
+                  <a:schemeClr val="dk1"/>
+                </a:solidFill>
+                <a:latin typeface="Verdana"/>
+                <a:ea typeface="Verdana"/>
+                <a:cs typeface="Verdana"/>
+                <a:sym typeface="Verdana"/>
+              </a:rPr>
+              <a:t> care (HC) or</a:t>
+            </a:r>
+            <a:endParaRPr sz="1900" b="1" dirty="0">
               <a:solidFill>
                 <a:schemeClr val="dk1"/>
               </a:solidFill>
@@ -26826,7 +28616,7 @@
               <a:buChar char="●"/>
             </a:pPr>
             <a:r>
-              <a:rPr lang="nl-NL" sz="1900" b="1">
+              <a:rPr lang="nl-NL" sz="1900" b="1" dirty="0">
                 <a:solidFill>
                   <a:schemeClr val="dk1"/>
                 </a:solidFill>
@@ -26835,9 +28625,33 @@
                 <a:cs typeface="Verdana"/>
                 <a:sym typeface="Verdana"/>
               </a:rPr>
-              <a:t>Continue routine practice (RP).</a:t>
+              <a:t>Continue routine </a:t>
             </a:r>
-            <a:endParaRPr sz="1900" b="1">
+            <a:r>
+              <a:rPr lang="nl-NL" sz="1900" b="1" dirty="0" err="1">
+                <a:solidFill>
+                  <a:schemeClr val="dk1"/>
+                </a:solidFill>
+                <a:latin typeface="Verdana"/>
+                <a:ea typeface="Verdana"/>
+                <a:cs typeface="Verdana"/>
+                <a:sym typeface="Verdana"/>
+              </a:rPr>
+              <a:t>practice</a:t>
+            </a:r>
+            <a:r>
+              <a:rPr lang="nl-NL" sz="1900" b="1" dirty="0">
+                <a:solidFill>
+                  <a:schemeClr val="dk1"/>
+                </a:solidFill>
+                <a:latin typeface="Verdana"/>
+                <a:ea typeface="Verdana"/>
+                <a:cs typeface="Verdana"/>
+                <a:sym typeface="Verdana"/>
+              </a:rPr>
+              <a:t> (RP).</a:t>
+            </a:r>
+            <a:endParaRPr sz="1900" b="1" dirty="0">
               <a:solidFill>
                 <a:schemeClr val="dk1"/>
               </a:solidFill>
@@ -26858,7 +28672,7 @@
               <a:buNone/>
             </a:pPr>
             <a:r>
-              <a:rPr lang="nl-NL" sz="1900" b="1">
+              <a:rPr lang="nl-NL" sz="1900" b="1" dirty="0" err="1">
                 <a:solidFill>
                   <a:schemeClr val="dk1"/>
                 </a:solidFill>
@@ -26867,9 +28681,21 @@
                 <a:cs typeface="Verdana"/>
                 <a:sym typeface="Verdana"/>
               </a:rPr>
-              <a:t>Strategies are different on:</a:t>
+              <a:t>Strategies</a:t>
             </a:r>
-            <a:endParaRPr sz="1900" b="1">
+            <a:r>
+              <a:rPr lang="nl-NL" sz="1900" b="1" dirty="0">
+                <a:solidFill>
+                  <a:schemeClr val="dk1"/>
+                </a:solidFill>
+                <a:latin typeface="Verdana"/>
+                <a:ea typeface="Verdana"/>
+                <a:cs typeface="Verdana"/>
+                <a:sym typeface="Verdana"/>
+              </a:rPr>
+              <a:t> are different on:</a:t>
+            </a:r>
+            <a:endParaRPr sz="1900" b="1" dirty="0">
               <a:solidFill>
                 <a:schemeClr val="dk1"/>
               </a:solidFill>
@@ -26895,7 +28721,7 @@
               <a:buChar char="●"/>
             </a:pPr>
             <a:r>
-              <a:rPr lang="nl-NL" sz="1900" b="1">
+              <a:rPr lang="nl-NL" sz="1900" b="1" dirty="0" err="1">
                 <a:solidFill>
                   <a:schemeClr val="dk1"/>
                 </a:solidFill>
@@ -26904,9 +28730,201 @@
                 <a:cs typeface="Verdana"/>
                 <a:sym typeface="Verdana"/>
               </a:rPr>
-              <a:t>Probability of early detection (ed) vs late detection (ld) of recurrence of     colorectal cancer</a:t>
+              <a:t>Probability</a:t>
             </a:r>
-            <a:endParaRPr sz="1900" b="1">
+            <a:r>
+              <a:rPr lang="nl-NL" sz="1900" b="1" dirty="0">
+                <a:solidFill>
+                  <a:schemeClr val="dk1"/>
+                </a:solidFill>
+                <a:latin typeface="Verdana"/>
+                <a:ea typeface="Verdana"/>
+                <a:cs typeface="Verdana"/>
+                <a:sym typeface="Verdana"/>
+              </a:rPr>
+              <a:t> of </a:t>
+            </a:r>
+            <a:r>
+              <a:rPr lang="nl-NL" sz="1900" b="1" dirty="0" err="1">
+                <a:solidFill>
+                  <a:schemeClr val="dk1"/>
+                </a:solidFill>
+                <a:latin typeface="Verdana"/>
+                <a:ea typeface="Verdana"/>
+                <a:cs typeface="Verdana"/>
+                <a:sym typeface="Verdana"/>
+              </a:rPr>
+              <a:t>early</a:t>
+            </a:r>
+            <a:r>
+              <a:rPr lang="nl-NL" sz="1900" b="1" dirty="0">
+                <a:solidFill>
+                  <a:schemeClr val="dk1"/>
+                </a:solidFill>
+                <a:latin typeface="Verdana"/>
+                <a:ea typeface="Verdana"/>
+                <a:cs typeface="Verdana"/>
+                <a:sym typeface="Verdana"/>
+              </a:rPr>
+              <a:t> </a:t>
+            </a:r>
+            <a:r>
+              <a:rPr lang="nl-NL" sz="1900" b="1" dirty="0" err="1">
+                <a:solidFill>
+                  <a:schemeClr val="dk1"/>
+                </a:solidFill>
+                <a:latin typeface="Verdana"/>
+                <a:ea typeface="Verdana"/>
+                <a:cs typeface="Verdana"/>
+                <a:sym typeface="Verdana"/>
+              </a:rPr>
+              <a:t>detection</a:t>
+            </a:r>
+            <a:r>
+              <a:rPr lang="nl-NL" sz="1900" b="1" dirty="0">
+                <a:solidFill>
+                  <a:schemeClr val="dk1"/>
+                </a:solidFill>
+                <a:latin typeface="Verdana"/>
+                <a:ea typeface="Verdana"/>
+                <a:cs typeface="Verdana"/>
+                <a:sym typeface="Verdana"/>
+              </a:rPr>
+              <a:t> (</a:t>
+            </a:r>
+            <a:r>
+              <a:rPr lang="nl-NL" sz="1900" b="1" dirty="0" err="1">
+                <a:solidFill>
+                  <a:schemeClr val="dk1"/>
+                </a:solidFill>
+                <a:latin typeface="Verdana"/>
+                <a:ea typeface="Verdana"/>
+                <a:cs typeface="Verdana"/>
+                <a:sym typeface="Verdana"/>
+              </a:rPr>
+              <a:t>ed</a:t>
+            </a:r>
+            <a:r>
+              <a:rPr lang="nl-NL" sz="1900" b="1" dirty="0">
+                <a:solidFill>
+                  <a:schemeClr val="dk1"/>
+                </a:solidFill>
+                <a:latin typeface="Verdana"/>
+                <a:ea typeface="Verdana"/>
+                <a:cs typeface="Verdana"/>
+                <a:sym typeface="Verdana"/>
+              </a:rPr>
+              <a:t>) </a:t>
+            </a:r>
+            <a:r>
+              <a:rPr lang="nl-NL" sz="1900" b="1" dirty="0" err="1">
+                <a:solidFill>
+                  <a:schemeClr val="dk1"/>
+                </a:solidFill>
+                <a:latin typeface="Verdana"/>
+                <a:ea typeface="Verdana"/>
+                <a:cs typeface="Verdana"/>
+                <a:sym typeface="Verdana"/>
+              </a:rPr>
+              <a:t>vs</a:t>
+            </a:r>
+            <a:r>
+              <a:rPr lang="nl-NL" sz="1900" b="1" dirty="0">
+                <a:solidFill>
+                  <a:schemeClr val="dk1"/>
+                </a:solidFill>
+                <a:latin typeface="Verdana"/>
+                <a:ea typeface="Verdana"/>
+                <a:cs typeface="Verdana"/>
+                <a:sym typeface="Verdana"/>
+              </a:rPr>
+              <a:t> late </a:t>
+            </a:r>
+            <a:r>
+              <a:rPr lang="nl-NL" sz="1900" b="1" dirty="0" err="1">
+                <a:solidFill>
+                  <a:schemeClr val="dk1"/>
+                </a:solidFill>
+                <a:latin typeface="Verdana"/>
+                <a:ea typeface="Verdana"/>
+                <a:cs typeface="Verdana"/>
+                <a:sym typeface="Verdana"/>
+              </a:rPr>
+              <a:t>detection</a:t>
+            </a:r>
+            <a:r>
+              <a:rPr lang="nl-NL" sz="1900" b="1" dirty="0">
+                <a:solidFill>
+                  <a:schemeClr val="dk1"/>
+                </a:solidFill>
+                <a:latin typeface="Verdana"/>
+                <a:ea typeface="Verdana"/>
+                <a:cs typeface="Verdana"/>
+                <a:sym typeface="Verdana"/>
+              </a:rPr>
+              <a:t> (ld) of </a:t>
+            </a:r>
+            <a:r>
+              <a:rPr lang="nl-NL" sz="1900" b="1" dirty="0" err="1">
+                <a:solidFill>
+                  <a:schemeClr val="dk1"/>
+                </a:solidFill>
+                <a:latin typeface="Verdana"/>
+                <a:ea typeface="Verdana"/>
+                <a:cs typeface="Verdana"/>
+                <a:sym typeface="Verdana"/>
+              </a:rPr>
+              <a:t>recurrence</a:t>
+            </a:r>
+            <a:r>
+              <a:rPr lang="nl-NL" sz="1900" b="1" dirty="0">
+                <a:solidFill>
+                  <a:schemeClr val="dk1"/>
+                </a:solidFill>
+                <a:latin typeface="Verdana"/>
+                <a:ea typeface="Verdana"/>
+                <a:cs typeface="Verdana"/>
+                <a:sym typeface="Verdana"/>
+              </a:rPr>
+              <a:t> of </a:t>
+            </a:r>
+            <a:r>
+              <a:rPr lang="nl-NL" sz="1900" b="1" dirty="0" err="1">
+                <a:solidFill>
+                  <a:schemeClr val="dk1"/>
+                </a:solidFill>
+                <a:latin typeface="Verdana"/>
+                <a:ea typeface="Verdana"/>
+                <a:cs typeface="Verdana"/>
+                <a:sym typeface="Verdana"/>
+              </a:rPr>
+              <a:t>colorectal</a:t>
+            </a:r>
+            <a:r>
+              <a:rPr lang="nl-NL" sz="1900" b="1" dirty="0">
+                <a:solidFill>
+                  <a:schemeClr val="dk1"/>
+                </a:solidFill>
+                <a:latin typeface="Verdana"/>
+                <a:ea typeface="Verdana"/>
+                <a:cs typeface="Verdana"/>
+                <a:sym typeface="Verdana"/>
+              </a:rPr>
+              <a:t> </a:t>
+            </a:r>
+            <a:r>
+              <a:rPr lang="nl-NL" sz="1900" b="1" dirty="0" err="1">
+                <a:solidFill>
+                  <a:schemeClr val="dk1"/>
+                </a:solidFill>
+                <a:latin typeface="Verdana"/>
+                <a:ea typeface="Verdana"/>
+                <a:cs typeface="Verdana"/>
+                <a:sym typeface="Verdana"/>
+              </a:rPr>
+              <a:t>cancer</a:t>
+            </a:r>
+            <a:endParaRPr sz="1900" b="1" dirty="0">
               <a:solidFill>
                 <a:schemeClr val="dk1"/>
               </a:solidFill>
@@ -26932,7 +28950,7 @@
               <a:buChar char="●"/>
             </a:pPr>
             <a:r>
-              <a:rPr lang="nl-NL" sz="1900" b="1">
+              <a:rPr lang="nl-NL" sz="1900" b="1" dirty="0">
                 <a:solidFill>
                   <a:schemeClr val="dk1"/>
                 </a:solidFill>
@@ -26941,9 +28959,45 @@
                 <a:cs typeface="Verdana"/>
                 <a:sym typeface="Verdana"/>
               </a:rPr>
-              <a:t>Follow-up costs (C) in UK pounds.</a:t>
+              <a:t>Follow-up </a:t>
             </a:r>
-            <a:endParaRPr sz="1900" b="1">
+            <a:r>
+              <a:rPr lang="nl-NL" sz="1900" b="1" dirty="0" err="1">
+                <a:solidFill>
+                  <a:schemeClr val="dk1"/>
+                </a:solidFill>
+                <a:latin typeface="Verdana"/>
+                <a:ea typeface="Verdana"/>
+                <a:cs typeface="Verdana"/>
+                <a:sym typeface="Verdana"/>
+              </a:rPr>
+              <a:t>costs</a:t>
+            </a:r>
+            <a:r>
+              <a:rPr lang="nl-NL" sz="1900" b="1" dirty="0">
+                <a:solidFill>
+                  <a:schemeClr val="dk1"/>
+                </a:solidFill>
+                <a:latin typeface="Verdana"/>
+                <a:ea typeface="Verdana"/>
+                <a:cs typeface="Verdana"/>
+                <a:sym typeface="Verdana"/>
+              </a:rPr>
+              <a:t> (C) in UK </a:t>
+            </a:r>
+            <a:r>
+              <a:rPr lang="nl-NL" sz="1900" b="1" dirty="0" err="1">
+                <a:solidFill>
+                  <a:schemeClr val="dk1"/>
+                </a:solidFill>
+                <a:latin typeface="Verdana"/>
+                <a:ea typeface="Verdana"/>
+                <a:cs typeface="Verdana"/>
+                <a:sym typeface="Verdana"/>
+              </a:rPr>
+              <a:t>pounds</a:t>
+            </a:r>
+            <a:endParaRPr sz="1900" b="1" dirty="0">
               <a:solidFill>
                 <a:schemeClr val="dk1"/>
               </a:solidFill>
@@ -26969,7 +29023,7 @@
               <a:buChar char="●"/>
             </a:pPr>
             <a:r>
-              <a:rPr lang="nl-NL" sz="1900" b="1">
+              <a:rPr lang="nl-NL" sz="1900" b="1" dirty="0" err="1">
                 <a:solidFill>
                   <a:schemeClr val="dk1"/>
                 </a:solidFill>
@@ -26978,9 +29032,165 @@
                 <a:cs typeface="Verdana"/>
                 <a:sym typeface="Verdana"/>
               </a:rPr>
-              <a:t>Differences in early detection rates are associated with life expectancy (LE)</a:t>
+              <a:t>Differences</a:t>
             </a:r>
-            <a:endParaRPr sz="1900" b="1">
+            <a:r>
+              <a:rPr lang="nl-NL" sz="1900" b="1" dirty="0">
+                <a:solidFill>
+                  <a:schemeClr val="dk1"/>
+                </a:solidFill>
+                <a:latin typeface="Verdana"/>
+                <a:ea typeface="Verdana"/>
+                <a:cs typeface="Verdana"/>
+                <a:sym typeface="Verdana"/>
+              </a:rPr>
+              <a:t> in </a:t>
+            </a:r>
+            <a:r>
+              <a:rPr lang="nl-NL" sz="1900" b="1" dirty="0" err="1">
+                <a:solidFill>
+                  <a:schemeClr val="dk1"/>
+                </a:solidFill>
+                <a:latin typeface="Verdana"/>
+                <a:ea typeface="Verdana"/>
+                <a:cs typeface="Verdana"/>
+                <a:sym typeface="Verdana"/>
+              </a:rPr>
+              <a:t>early</a:t>
+            </a:r>
+            <a:r>
+              <a:rPr lang="nl-NL" sz="1900" b="1" dirty="0">
+                <a:solidFill>
+                  <a:schemeClr val="dk1"/>
+                </a:solidFill>
+                <a:latin typeface="Verdana"/>
+                <a:ea typeface="Verdana"/>
+                <a:cs typeface="Verdana"/>
+                <a:sym typeface="Verdana"/>
+              </a:rPr>
+              <a:t> </a:t>
+            </a:r>
+            <a:r>
+              <a:rPr lang="nl-NL" sz="1900" b="1" dirty="0" err="1">
+                <a:solidFill>
+                  <a:schemeClr val="dk1"/>
+                </a:solidFill>
+                <a:latin typeface="Verdana"/>
+                <a:ea typeface="Verdana"/>
+                <a:cs typeface="Verdana"/>
+                <a:sym typeface="Verdana"/>
+              </a:rPr>
+              <a:t>detection</a:t>
+            </a:r>
+            <a:r>
+              <a:rPr lang="nl-NL" sz="1900" b="1" dirty="0">
+                <a:solidFill>
+                  <a:schemeClr val="dk1"/>
+                </a:solidFill>
+                <a:latin typeface="Verdana"/>
+                <a:ea typeface="Verdana"/>
+                <a:cs typeface="Verdana"/>
+                <a:sym typeface="Verdana"/>
+              </a:rPr>
+              <a:t> </a:t>
+            </a:r>
+            <a:r>
+              <a:rPr lang="nl-NL" sz="1900" b="1" dirty="0" err="1">
+                <a:solidFill>
+                  <a:schemeClr val="dk1"/>
+                </a:solidFill>
+                <a:latin typeface="Verdana"/>
+                <a:ea typeface="Verdana"/>
+                <a:cs typeface="Verdana"/>
+                <a:sym typeface="Verdana"/>
+              </a:rPr>
+              <a:t>rates</a:t>
+            </a:r>
+            <a:r>
+              <a:rPr lang="nl-NL" sz="1900" b="1" dirty="0">
+                <a:solidFill>
+                  <a:schemeClr val="dk1"/>
+                </a:solidFill>
+                <a:latin typeface="Verdana"/>
+                <a:ea typeface="Verdana"/>
+                <a:cs typeface="Verdana"/>
+                <a:sym typeface="Verdana"/>
+              </a:rPr>
+              <a:t> are </a:t>
+            </a:r>
+            <a:r>
+              <a:rPr lang="nl-NL" sz="1900" b="1" dirty="0" err="1">
+                <a:solidFill>
+                  <a:schemeClr val="dk1"/>
+                </a:solidFill>
+                <a:latin typeface="Verdana"/>
+                <a:ea typeface="Verdana"/>
+                <a:cs typeface="Verdana"/>
+                <a:sym typeface="Verdana"/>
+              </a:rPr>
+              <a:t>associated</a:t>
+            </a:r>
+            <a:r>
+              <a:rPr lang="nl-NL" sz="1900" b="1" dirty="0">
+                <a:solidFill>
+                  <a:schemeClr val="dk1"/>
+                </a:solidFill>
+                <a:latin typeface="Verdana"/>
+                <a:ea typeface="Verdana"/>
+                <a:cs typeface="Verdana"/>
+                <a:sym typeface="Verdana"/>
+              </a:rPr>
+              <a:t> </a:t>
+            </a:r>
+            <a:r>
+              <a:rPr lang="nl-NL" sz="1900" b="1" dirty="0" err="1">
+                <a:solidFill>
+                  <a:schemeClr val="dk1"/>
+                </a:solidFill>
+                <a:latin typeface="Verdana"/>
+                <a:ea typeface="Verdana"/>
+                <a:cs typeface="Verdana"/>
+                <a:sym typeface="Verdana"/>
+              </a:rPr>
+              <a:t>with</a:t>
+            </a:r>
+            <a:r>
+              <a:rPr lang="nl-NL" sz="1900" b="1" dirty="0">
+                <a:solidFill>
+                  <a:schemeClr val="dk1"/>
+                </a:solidFill>
+                <a:latin typeface="Verdana"/>
+                <a:ea typeface="Verdana"/>
+                <a:cs typeface="Verdana"/>
+                <a:sym typeface="Verdana"/>
+              </a:rPr>
+              <a:t> life </a:t>
+            </a:r>
+            <a:r>
+              <a:rPr lang="nl-NL" sz="1900" b="1" dirty="0" err="1">
+                <a:solidFill>
+                  <a:schemeClr val="dk1"/>
+                </a:solidFill>
+                <a:latin typeface="Verdana"/>
+                <a:ea typeface="Verdana"/>
+                <a:cs typeface="Verdana"/>
+                <a:sym typeface="Verdana"/>
+              </a:rPr>
+              <a:t>expectancy</a:t>
+            </a:r>
+            <a:r>
+              <a:rPr lang="nl-NL" sz="1900" b="1" dirty="0">
+                <a:solidFill>
+                  <a:schemeClr val="dk1"/>
+                </a:solidFill>
+                <a:latin typeface="Verdana"/>
+                <a:ea typeface="Verdana"/>
+                <a:cs typeface="Verdana"/>
+                <a:sym typeface="Verdana"/>
+              </a:rPr>
+              <a:t> (LE)</a:t>
+            </a:r>
+            <a:endParaRPr sz="1900" b="1" dirty="0">
               <a:solidFill>
                 <a:schemeClr val="dk1"/>
               </a:solidFill>
@@ -27087,7 +29297,11 @@
             <a:graphicFrameLocks noGrp="1"/>
           </p:cNvGraphicFramePr>
           <p:nvPr>
-            <p:extLst/>
+            <p:extLst>
+              <p:ext uri="{D42A27DB-BD31-4B8C-83A1-F6EECF244321}">
+                <p14:modId xmlns:p14="http://schemas.microsoft.com/office/powerpoint/2010/main" val="2200477139"/>
+              </p:ext>
+            </p:extLst>
           </p:nvPr>
         </p:nvGraphicFramePr>
         <p:xfrm>
@@ -27214,12 +29428,12 @@
                         </a:tabLst>
                       </a:pPr>
                       <a:r>
-                        <a:rPr lang="en-US" sz="1800">
+                        <a:rPr lang="en-US" sz="1800" dirty="0">
                           <a:effectLst/>
                         </a:rPr>
-                        <a:t>Value</a:t>
+                        <a:t>value</a:t>
                       </a:r>
-                      <a:endParaRPr lang="en-US" sz="2400">
+                      <a:endParaRPr lang="en-US" sz="2400" dirty="0">
                         <a:effectLst/>
                         <a:latin typeface="Calibri" panose="020F0502020204030204" pitchFamily="34" charset="0"/>
                         <a:ea typeface="Calibri" panose="020F0502020204030204" pitchFamily="34" charset="0"/>
@@ -27403,12 +29617,12 @@
                         </a:tabLst>
                       </a:pPr>
                       <a:r>
-                        <a:rPr lang="en-US" sz="1800">
+                        <a:rPr lang="en-US" sz="1800" dirty="0" err="1">
                           <a:effectLst/>
                         </a:rPr>
-                        <a:t>p.PCed</a:t>
+                        <a:t>p_PCed</a:t>
                       </a:r>
-                      <a:endParaRPr lang="en-US" sz="2400">
+                      <a:endParaRPr lang="en-US" sz="2400" dirty="0">
                         <a:effectLst/>
                         <a:latin typeface="Calibri" panose="020F0502020204030204" pitchFamily="34" charset="0"/>
                         <a:ea typeface="Calibri" panose="020F0502020204030204" pitchFamily="34" charset="0"/>
@@ -27515,12 +29729,12 @@
                         </a:tabLst>
                       </a:pPr>
                       <a:r>
-                        <a:rPr lang="en-US" sz="1800">
+                        <a:rPr lang="en-US" sz="1800" dirty="0" err="1">
                           <a:effectLst/>
                         </a:rPr>
-                        <a:t>p.HCed</a:t>
+                        <a:t>p_HCed</a:t>
                       </a:r>
-                      <a:endParaRPr lang="en-US" sz="2400">
+                      <a:endParaRPr lang="en-US" sz="2400" dirty="0">
                         <a:effectLst/>
                         <a:latin typeface="Calibri" panose="020F0502020204030204" pitchFamily="34" charset="0"/>
                         <a:ea typeface="Calibri" panose="020F0502020204030204" pitchFamily="34" charset="0"/>
@@ -27627,12 +29841,12 @@
                         </a:tabLst>
                       </a:pPr>
                       <a:r>
-                        <a:rPr lang="en-US" sz="1800">
+                        <a:rPr lang="en-US" sz="1800" dirty="0" err="1">
                           <a:effectLst/>
                         </a:rPr>
-                        <a:t>p.RPed</a:t>
+                        <a:t>p_RPed</a:t>
                       </a:r>
-                      <a:endParaRPr lang="en-US" sz="2400">
+                      <a:endParaRPr lang="en-US" sz="2400" dirty="0">
                         <a:effectLst/>
                         <a:latin typeface="Calibri" panose="020F0502020204030204" pitchFamily="34" charset="0"/>
                         <a:ea typeface="Calibri" panose="020F0502020204030204" pitchFamily="34" charset="0"/>
@@ -27851,12 +30065,12 @@
                         </a:tabLst>
                       </a:pPr>
                       <a:r>
-                        <a:rPr lang="en-US" sz="1800">
+                        <a:rPr lang="en-US" sz="1800" dirty="0" err="1">
                           <a:effectLst/>
                         </a:rPr>
-                        <a:t>le.ed</a:t>
+                        <a:t>le_ed</a:t>
                       </a:r>
-                      <a:endParaRPr lang="en-US" sz="2400">
+                      <a:endParaRPr lang="en-US" sz="2400" dirty="0">
                         <a:effectLst/>
                         <a:latin typeface="Calibri" panose="020F0502020204030204" pitchFamily="34" charset="0"/>
                         <a:ea typeface="Calibri" panose="020F0502020204030204" pitchFamily="34" charset="0"/>
@@ -27963,12 +30177,12 @@
                         </a:tabLst>
                       </a:pPr>
                       <a:r>
-                        <a:rPr lang="en-US" sz="1800">
+                        <a:rPr lang="en-US" sz="1800" dirty="0" err="1">
                           <a:effectLst/>
                         </a:rPr>
-                        <a:t>le.ld</a:t>
+                        <a:t>le_ld</a:t>
                       </a:r>
-                      <a:endParaRPr lang="en-US" sz="2400">
+                      <a:endParaRPr lang="en-US" sz="2400" dirty="0">
                         <a:effectLst/>
                         <a:latin typeface="Calibri" panose="020F0502020204030204" pitchFamily="34" charset="0"/>
                         <a:ea typeface="Calibri" panose="020F0502020204030204" pitchFamily="34" charset="0"/>
@@ -28215,7 +30429,7 @@
                         <a:rPr lang="en-US" sz="1800" dirty="0" err="1">
                           <a:effectLst/>
                         </a:rPr>
-                        <a:t>c.PCed</a:t>
+                        <a:t>c_PCed</a:t>
                       </a:r>
                       <a:r>
                         <a:rPr lang="en-US" sz="1800" dirty="0">
@@ -28330,12 +30544,12 @@
                         </a:tabLst>
                       </a:pPr>
                       <a:r>
-                        <a:rPr lang="en-US" sz="1800">
+                        <a:rPr lang="en-US" sz="1800" dirty="0" err="1">
                           <a:effectLst/>
                         </a:rPr>
-                        <a:t>c.HCed</a:t>
+                        <a:t>c_HCed</a:t>
                       </a:r>
-                      <a:endParaRPr lang="en-US" sz="2400">
+                      <a:endParaRPr lang="en-US" sz="2400" dirty="0">
                         <a:effectLst/>
                         <a:latin typeface="Calibri" panose="020F0502020204030204" pitchFamily="34" charset="0"/>
                         <a:ea typeface="Calibri" panose="020F0502020204030204" pitchFamily="34" charset="0"/>
@@ -28442,12 +30656,12 @@
                         </a:tabLst>
                       </a:pPr>
                       <a:r>
-                        <a:rPr lang="en-US" sz="1800">
+                        <a:rPr lang="en-US" sz="1800" dirty="0" err="1">
                           <a:effectLst/>
                         </a:rPr>
-                        <a:t>c.RPed</a:t>
+                        <a:t>c_RPed</a:t>
                       </a:r>
-                      <a:endParaRPr lang="en-US" sz="2400">
+                      <a:endParaRPr lang="en-US" sz="2400" dirty="0">
                         <a:effectLst/>
                         <a:latin typeface="Calibri" panose="020F0502020204030204" pitchFamily="34" charset="0"/>
                         <a:ea typeface="Calibri" panose="020F0502020204030204" pitchFamily="34" charset="0"/>
@@ -28554,12 +30768,12 @@
                         </a:tabLst>
                       </a:pPr>
                       <a:r>
-                        <a:rPr lang="en-US" sz="1800">
+                        <a:rPr lang="en-US" sz="1800" dirty="0" err="1">
                           <a:effectLst/>
                         </a:rPr>
-                        <a:t>c.PCld</a:t>
+                        <a:t>c_PCld</a:t>
                       </a:r>
-                      <a:endParaRPr lang="en-US" sz="2400">
+                      <a:endParaRPr lang="en-US" sz="2400" dirty="0">
                         <a:effectLst/>
                         <a:latin typeface="Calibri" panose="020F0502020204030204" pitchFamily="34" charset="0"/>
                         <a:ea typeface="Calibri" panose="020F0502020204030204" pitchFamily="34" charset="0"/>
@@ -28666,12 +30880,12 @@
                         </a:tabLst>
                       </a:pPr>
                       <a:r>
-                        <a:rPr lang="en-US" sz="1800">
+                        <a:rPr lang="en-US" sz="1800" dirty="0" err="1">
                           <a:effectLst/>
                         </a:rPr>
-                        <a:t>c.HCld</a:t>
+                        <a:t>c_HCld</a:t>
                       </a:r>
-                      <a:endParaRPr lang="en-US" sz="2400">
+                      <a:endParaRPr lang="en-US" sz="2400" dirty="0">
                         <a:effectLst/>
                         <a:latin typeface="Calibri" panose="020F0502020204030204" pitchFamily="34" charset="0"/>
                         <a:ea typeface="Calibri" panose="020F0502020204030204" pitchFamily="34" charset="0"/>
@@ -28778,12 +30992,12 @@
                         </a:tabLst>
                       </a:pPr>
                       <a:r>
-                        <a:rPr lang="en-US" sz="1800">
+                        <a:rPr lang="en-US" sz="1800" dirty="0" err="1">
                           <a:effectLst/>
                         </a:rPr>
-                        <a:t>c.RPld</a:t>
+                        <a:t>c_RPld</a:t>
                       </a:r>
-                      <a:endParaRPr lang="en-US" sz="2400">
+                      <a:endParaRPr lang="en-US" sz="2400" dirty="0">
                         <a:effectLst/>
                         <a:latin typeface="Calibri" panose="020F0502020204030204" pitchFamily="34" charset="0"/>
                         <a:ea typeface="Calibri" panose="020F0502020204030204" pitchFamily="34" charset="0"/>

</xml_diff>

<commit_message>
Update table to newest coding convention
</commit_message>
<xml_diff>
--- a/Decision trees/Slides/Decision Trees.pptx
+++ b/Decision trees/Slides/Decision Trees.pptx
@@ -1971,7 +1971,7 @@
         </p:nvSpPr>
         <p:spPr>
           <a:xfrm>
-            <a:off x="1143300" y="685800"/>
+            <a:off x="1143000" y="685800"/>
             <a:ext cx="4572000" cy="3429000"/>
           </a:xfrm>
           <a:custGeom>
@@ -2079,7 +2079,7 @@
         </p:nvSpPr>
         <p:spPr>
           <a:xfrm>
-            <a:off x="1143300" y="685800"/>
+            <a:off x="1143000" y="685800"/>
             <a:ext cx="4572000" cy="3429000"/>
           </a:xfrm>
           <a:custGeom>
@@ -2187,7 +2187,7 @@
         </p:nvSpPr>
         <p:spPr>
           <a:xfrm>
-            <a:off x="1143300" y="685800"/>
+            <a:off x="1143000" y="685800"/>
             <a:ext cx="4572000" cy="3429000"/>
           </a:xfrm>
           <a:custGeom>
@@ -2295,7 +2295,7 @@
         </p:nvSpPr>
         <p:spPr>
           <a:xfrm>
-            <a:off x="1143300" y="685800"/>
+            <a:off x="1143000" y="685800"/>
             <a:ext cx="4572000" cy="3429000"/>
           </a:xfrm>
           <a:custGeom>
@@ -2403,7 +2403,7 @@
         </p:nvSpPr>
         <p:spPr>
           <a:xfrm>
-            <a:off x="1143300" y="685800"/>
+            <a:off x="1143000" y="685800"/>
             <a:ext cx="4572000" cy="3429000"/>
           </a:xfrm>
           <a:custGeom>
@@ -2511,7 +2511,7 @@
         </p:nvSpPr>
         <p:spPr>
           <a:xfrm>
-            <a:off x="1143300" y="685800"/>
+            <a:off x="1143000" y="685800"/>
             <a:ext cx="4572000" cy="3429000"/>
           </a:xfrm>
           <a:custGeom>
@@ -11593,32 +11593,6 @@
           </a:p>
         </p:txBody>
       </p:sp>
-      <p:cxnSp>
-        <p:nvCxnSpPr>
-          <p:cNvPr id="213" name="Google Shape;213;p33"/>
-          <p:cNvCxnSpPr/>
-          <p:nvPr/>
-        </p:nvCxnSpPr>
-        <p:spPr>
-          <a:xfrm>
-            <a:off x="5029675" y="5994000"/>
-            <a:ext cx="468300" cy="0"/>
-          </a:xfrm>
-          <a:prstGeom prst="straightConnector1">
-            <a:avLst/>
-          </a:prstGeom>
-          <a:noFill/>
-          <a:ln w="19050" cap="flat" cmpd="sng">
-            <a:solidFill>
-              <a:schemeClr val="lt1"/>
-            </a:solidFill>
-            <a:prstDash val="solid"/>
-            <a:round/>
-            <a:headEnd type="none" w="sm" len="sm"/>
-            <a:tailEnd type="none" w="sm" len="sm"/>
-          </a:ln>
-        </p:spPr>
-      </p:cxnSp>
       <p:sp>
         <p:nvSpPr>
           <p:cNvPr id="214" name="Google Shape;214;p33"/>
@@ -21736,7 +21710,7 @@
         <p:spPr>
           <a:xfrm>
             <a:off x="0" y="-1728"/>
-            <a:ext cx="685800" cy="6959100"/>
+            <a:ext cx="685800" cy="6859728"/>
           </a:xfrm>
           <a:prstGeom prst="rect">
             <a:avLst/>
@@ -25059,6 +25033,58 @@
           </a:p>
         </p:txBody>
       </p:sp>
+      <p:sp>
+        <p:nvSpPr>
+          <p:cNvPr id="2" name="TextBox 1">
+            <a:extLst>
+              <a:ext uri="{FF2B5EF4-FFF2-40B4-BE49-F238E27FC236}">
+                <a16:creationId xmlns:a16="http://schemas.microsoft.com/office/drawing/2014/main" id="{311933C2-79D4-314F-9196-83555419E62B}"/>
+              </a:ext>
+            </a:extLst>
+          </p:cNvPr>
+          <p:cNvSpPr txBox="1"/>
+          <p:nvPr/>
+        </p:nvSpPr>
+        <p:spPr>
+          <a:xfrm>
+            <a:off x="98854" y="6450145"/>
+            <a:ext cx="3800148" cy="307777"/>
+          </a:xfrm>
+          <a:prstGeom prst="rect">
+            <a:avLst/>
+          </a:prstGeom>
+          <a:noFill/>
+        </p:spPr>
+        <p:txBody>
+          <a:bodyPr wrap="square" rtlCol="0">
+            <a:spAutoFit/>
+          </a:bodyPr>
+          <a:lstStyle/>
+          <a:p>
+            <a:r>
+              <a:rPr lang="en-US" dirty="0">
+                <a:solidFill>
+                  <a:schemeClr val="bg2"/>
+                </a:solidFill>
+              </a:rPr>
+              <a:t>Decision tree made in </a:t>
+            </a:r>
+            <a:r>
+              <a:rPr lang="en-US" dirty="0" err="1">
+                <a:solidFill>
+                  <a:schemeClr val="bg2"/>
+                </a:solidFill>
+              </a:rPr>
+              <a:t>myopentree.com</a:t>
+            </a:r>
+            <a:endParaRPr lang="en-US" dirty="0">
+              <a:solidFill>
+                <a:schemeClr val="bg2"/>
+              </a:solidFill>
+            </a:endParaRPr>
+          </a:p>
+        </p:txBody>
+      </p:sp>
     </p:spTree>
   </p:cSld>
   <p:clrMapOvr>
@@ -27087,7 +27113,11 @@
             <a:graphicFrameLocks noGrp="1"/>
           </p:cNvGraphicFramePr>
           <p:nvPr>
-            <p:extLst/>
+            <p:extLst>
+              <p:ext uri="{D42A27DB-BD31-4B8C-83A1-F6EECF244321}">
+                <p14:modId xmlns:p14="http://schemas.microsoft.com/office/powerpoint/2010/main" val="3338629911"/>
+              </p:ext>
+            </p:extLst>
           </p:nvPr>
         </p:nvGraphicFramePr>
         <p:xfrm>
@@ -27403,12 +27433,12 @@
                         </a:tabLst>
                       </a:pPr>
                       <a:r>
-                        <a:rPr lang="en-US" sz="1800">
+                        <a:rPr lang="en-US" sz="1800" dirty="0" err="1">
                           <a:effectLst/>
                         </a:rPr>
-                        <a:t>p.PCed</a:t>
+                        <a:t>p_PCed</a:t>
                       </a:r>
-                      <a:endParaRPr lang="en-US" sz="2400">
+                      <a:endParaRPr lang="en-US" sz="2400" dirty="0">
                         <a:effectLst/>
                         <a:latin typeface="Calibri" panose="020F0502020204030204" pitchFamily="34" charset="0"/>
                         <a:ea typeface="Calibri" panose="020F0502020204030204" pitchFamily="34" charset="0"/>
@@ -27515,12 +27545,12 @@
                         </a:tabLst>
                       </a:pPr>
                       <a:r>
-                        <a:rPr lang="en-US" sz="1800">
+                        <a:rPr lang="en-US" sz="1800" dirty="0" err="1">
                           <a:effectLst/>
                         </a:rPr>
-                        <a:t>p.HCed</a:t>
+                        <a:t>p_HCed</a:t>
                       </a:r>
-                      <a:endParaRPr lang="en-US" sz="2400">
+                      <a:endParaRPr lang="en-US" sz="2400" dirty="0">
                         <a:effectLst/>
                         <a:latin typeface="Calibri" panose="020F0502020204030204" pitchFamily="34" charset="0"/>
                         <a:ea typeface="Calibri" panose="020F0502020204030204" pitchFamily="34" charset="0"/>
@@ -27627,12 +27657,12 @@
                         </a:tabLst>
                       </a:pPr>
                       <a:r>
-                        <a:rPr lang="en-US" sz="1800">
+                        <a:rPr lang="en-US" sz="1800" dirty="0" err="1">
                           <a:effectLst/>
                         </a:rPr>
-                        <a:t>p.RPed</a:t>
+                        <a:t>p_RPed</a:t>
                       </a:r>
-                      <a:endParaRPr lang="en-US" sz="2400">
+                      <a:endParaRPr lang="en-US" sz="2400" dirty="0">
                         <a:effectLst/>
                         <a:latin typeface="Calibri" panose="020F0502020204030204" pitchFamily="34" charset="0"/>
                         <a:ea typeface="Calibri" panose="020F0502020204030204" pitchFamily="34" charset="0"/>
@@ -27739,12 +27769,12 @@
                         </a:tabLst>
                       </a:pPr>
                       <a:r>
-                        <a:rPr lang="en-US" sz="1800">
+                        <a:rPr lang="en-US" sz="1800" dirty="0">
                           <a:effectLst/>
                         </a:rPr>
                         <a:t> </a:t>
                       </a:r>
-                      <a:endParaRPr lang="en-US" sz="2400">
+                      <a:endParaRPr lang="en-US" sz="2400" dirty="0">
                         <a:effectLst/>
                         <a:latin typeface="Calibri" panose="020F0502020204030204" pitchFamily="34" charset="0"/>
                         <a:ea typeface="Calibri" panose="020F0502020204030204" pitchFamily="34" charset="0"/>
@@ -27851,12 +27881,12 @@
                         </a:tabLst>
                       </a:pPr>
                       <a:r>
-                        <a:rPr lang="en-US" sz="1800">
+                        <a:rPr lang="en-US" sz="1800" dirty="0" err="1">
                           <a:effectLst/>
                         </a:rPr>
-                        <a:t>le.ed</a:t>
+                        <a:t>le_ed</a:t>
                       </a:r>
-                      <a:endParaRPr lang="en-US" sz="2400">
+                      <a:endParaRPr lang="en-US" sz="2400" dirty="0">
                         <a:effectLst/>
                         <a:latin typeface="Calibri" panose="020F0502020204030204" pitchFamily="34" charset="0"/>
                         <a:ea typeface="Calibri" panose="020F0502020204030204" pitchFamily="34" charset="0"/>
@@ -27963,12 +27993,12 @@
                         </a:tabLst>
                       </a:pPr>
                       <a:r>
-                        <a:rPr lang="en-US" sz="1800">
+                        <a:rPr lang="en-US" sz="1800" dirty="0" err="1">
                           <a:effectLst/>
                         </a:rPr>
-                        <a:t>le.ld</a:t>
+                        <a:t>le_ld</a:t>
                       </a:r>
-                      <a:endParaRPr lang="en-US" sz="2400">
+                      <a:endParaRPr lang="en-US" sz="2400" dirty="0">
                         <a:effectLst/>
                         <a:latin typeface="Calibri" panose="020F0502020204030204" pitchFamily="34" charset="0"/>
                         <a:ea typeface="Calibri" panose="020F0502020204030204" pitchFamily="34" charset="0"/>
@@ -28215,7 +28245,7 @@
                         <a:rPr lang="en-US" sz="1800" dirty="0" err="1">
                           <a:effectLst/>
                         </a:rPr>
-                        <a:t>c.PCed</a:t>
+                        <a:t>c_PCed</a:t>
                       </a:r>
                       <a:r>
                         <a:rPr lang="en-US" sz="1800" dirty="0">
@@ -28330,12 +28360,12 @@
                         </a:tabLst>
                       </a:pPr>
                       <a:r>
-                        <a:rPr lang="en-US" sz="1800">
+                        <a:rPr lang="en-US" sz="1800" dirty="0" err="1">
                           <a:effectLst/>
                         </a:rPr>
-                        <a:t>c.HCed</a:t>
+                        <a:t>c_HCed</a:t>
                       </a:r>
-                      <a:endParaRPr lang="en-US" sz="2400">
+                      <a:endParaRPr lang="en-US" sz="2400" dirty="0">
                         <a:effectLst/>
                         <a:latin typeface="Calibri" panose="020F0502020204030204" pitchFamily="34" charset="0"/>
                         <a:ea typeface="Calibri" panose="020F0502020204030204" pitchFamily="34" charset="0"/>
@@ -28442,12 +28472,12 @@
                         </a:tabLst>
                       </a:pPr>
                       <a:r>
-                        <a:rPr lang="en-US" sz="1800">
+                        <a:rPr lang="en-US" sz="1800" dirty="0" err="1">
                           <a:effectLst/>
                         </a:rPr>
-                        <a:t>c.RPed</a:t>
+                        <a:t>c_RPed</a:t>
                       </a:r>
-                      <a:endParaRPr lang="en-US" sz="2400">
+                      <a:endParaRPr lang="en-US" sz="2400" dirty="0">
                         <a:effectLst/>
                         <a:latin typeface="Calibri" panose="020F0502020204030204" pitchFamily="34" charset="0"/>
                         <a:ea typeface="Calibri" panose="020F0502020204030204" pitchFamily="34" charset="0"/>
@@ -28554,12 +28584,12 @@
                         </a:tabLst>
                       </a:pPr>
                       <a:r>
-                        <a:rPr lang="en-US" sz="1800">
+                        <a:rPr lang="en-US" sz="1800" dirty="0" err="1">
                           <a:effectLst/>
                         </a:rPr>
-                        <a:t>c.PCld</a:t>
+                        <a:t>c_PCld</a:t>
                       </a:r>
-                      <a:endParaRPr lang="en-US" sz="2400">
+                      <a:endParaRPr lang="en-US" sz="2400" dirty="0">
                         <a:effectLst/>
                         <a:latin typeface="Calibri" panose="020F0502020204030204" pitchFamily="34" charset="0"/>
                         <a:ea typeface="Calibri" panose="020F0502020204030204" pitchFamily="34" charset="0"/>
@@ -28666,12 +28696,12 @@
                         </a:tabLst>
                       </a:pPr>
                       <a:r>
-                        <a:rPr lang="en-US" sz="1800">
+                        <a:rPr lang="en-US" sz="1800" dirty="0" err="1">
                           <a:effectLst/>
                         </a:rPr>
-                        <a:t>c.HCld</a:t>
+                        <a:t>c_HCld</a:t>
                       </a:r>
-                      <a:endParaRPr lang="en-US" sz="2400">
+                      <a:endParaRPr lang="en-US" sz="2400" dirty="0">
                         <a:effectLst/>
                         <a:latin typeface="Calibri" panose="020F0502020204030204" pitchFamily="34" charset="0"/>
                         <a:ea typeface="Calibri" panose="020F0502020204030204" pitchFamily="34" charset="0"/>
@@ -28778,12 +28808,12 @@
                         </a:tabLst>
                       </a:pPr>
                       <a:r>
-                        <a:rPr lang="en-US" sz="1800">
+                        <a:rPr lang="en-US" sz="1800" dirty="0" err="1">
                           <a:effectLst/>
                         </a:rPr>
-                        <a:t>c.RPld</a:t>
+                        <a:t>c_RPld</a:t>
                       </a:r>
-                      <a:endParaRPr lang="en-US" sz="2400">
+                      <a:endParaRPr lang="en-US" sz="2400" dirty="0">
                         <a:effectLst/>
                         <a:latin typeface="Calibri" panose="020F0502020204030204" pitchFamily="34" charset="0"/>
                         <a:ea typeface="Calibri" panose="020F0502020204030204" pitchFamily="34" charset="0"/>

</xml_diff>

<commit_message>
Update notation in decision tree slides
</commit_message>
<xml_diff>
--- a/Decision trees/Slides/Decision Trees.pptx
+++ b/Decision trees/Slides/Decision Trees.pptx
@@ -24749,8 +24749,8 @@
         </p:nvSpPr>
         <p:spPr>
           <a:xfrm>
-            <a:off x="6744450" y="1536633"/>
-            <a:ext cx="1533600" cy="4799700"/>
+            <a:off x="6744449" y="1536633"/>
+            <a:ext cx="1982861" cy="4799700"/>
           </a:xfrm>
           <a:prstGeom prst="rect">
             <a:avLst/>
@@ -24777,7 +24777,7 @@
               </a:spcAft>
               <a:buNone/>
             </a:pPr>
-            <a:endParaRPr/>
+            <a:endParaRPr dirty="0"/>
           </a:p>
           <a:p>
             <a:pPr marL="0" lvl="0" indent="0" algn="l" rtl="0">
@@ -24790,10 +24790,18 @@
               <a:buNone/>
             </a:pPr>
             <a:r>
-              <a:rPr lang="nl-NL"/>
-              <a:t>c.RPed; e.RPed</a:t>
+              <a:rPr lang="nl-NL" dirty="0" err="1"/>
+              <a:t>c_RPed</a:t>
             </a:r>
-            <a:endParaRPr/>
+            <a:r>
+              <a:rPr lang="nl-NL" dirty="0"/>
+              <a:t>; </a:t>
+            </a:r>
+            <a:r>
+              <a:rPr lang="nl-NL" dirty="0" err="1"/>
+              <a:t>e_RPed</a:t>
+            </a:r>
+            <a:endParaRPr dirty="0"/>
           </a:p>
           <a:p>
             <a:pPr marL="0" lvl="0" indent="0" algn="l" rtl="0">
@@ -24805,7 +24813,7 @@
               </a:spcAft>
               <a:buNone/>
             </a:pPr>
-            <a:endParaRPr sz="1600"/>
+            <a:endParaRPr sz="1600" dirty="0"/>
           </a:p>
           <a:p>
             <a:pPr marL="0" lvl="0" indent="0" algn="l" rtl="0">
@@ -24818,10 +24826,18 @@
               <a:buNone/>
             </a:pPr>
             <a:r>
-              <a:rPr lang="nl-NL"/>
-              <a:t>c.RPld;  e.RPld</a:t>
+              <a:rPr lang="nl-NL" dirty="0" err="1"/>
+              <a:t>c_RPld</a:t>
             </a:r>
-            <a:endParaRPr/>
+            <a:r>
+              <a:rPr lang="nl-NL" dirty="0"/>
+              <a:t>;  </a:t>
+            </a:r>
+            <a:r>
+              <a:rPr lang="nl-NL" dirty="0" err="1"/>
+              <a:t>e_RPld</a:t>
+            </a:r>
+            <a:endParaRPr dirty="0"/>
           </a:p>
           <a:p>
             <a:pPr marL="0" lvl="0" indent="0" algn="l" rtl="0">
@@ -24833,7 +24849,7 @@
               </a:spcAft>
               <a:buNone/>
             </a:pPr>
-            <a:endParaRPr/>
+            <a:endParaRPr dirty="0"/>
           </a:p>
           <a:p>
             <a:pPr marL="0" lvl="0" indent="0" algn="l" rtl="0">
@@ -24845,7 +24861,7 @@
               </a:spcAft>
               <a:buNone/>
             </a:pPr>
-            <a:endParaRPr/>
+            <a:endParaRPr dirty="0"/>
           </a:p>
           <a:p>
             <a:pPr marL="0" lvl="0" indent="0" algn="l" rtl="0">
@@ -24857,7 +24873,7 @@
               </a:spcAft>
               <a:buNone/>
             </a:pPr>
-            <a:endParaRPr/>
+            <a:endParaRPr dirty="0"/>
           </a:p>
           <a:p>
             <a:pPr marL="0" lvl="0" indent="0" algn="l" rtl="0">
@@ -24869,7 +24885,7 @@
               </a:spcAft>
               <a:buNone/>
             </a:pPr>
-            <a:endParaRPr/>
+            <a:endParaRPr dirty="0"/>
           </a:p>
           <a:p>
             <a:pPr marL="0" lvl="0" indent="0" algn="l" rtl="0">
@@ -24881,7 +24897,7 @@
               </a:spcAft>
               <a:buNone/>
             </a:pPr>
-            <a:endParaRPr/>
+            <a:endParaRPr dirty="0"/>
           </a:p>
           <a:p>
             <a:pPr marL="0" lvl="0" indent="0" algn="l" rtl="0">
@@ -24894,10 +24910,18 @@
               <a:buNone/>
             </a:pPr>
             <a:r>
-              <a:rPr lang="nl-NL"/>
-              <a:t>c.PCed; e.PCed</a:t>
+              <a:rPr lang="nl-NL" dirty="0" err="1"/>
+              <a:t>c_PCed</a:t>
             </a:r>
-            <a:endParaRPr/>
+            <a:r>
+              <a:rPr lang="nl-NL" dirty="0"/>
+              <a:t>; </a:t>
+            </a:r>
+            <a:r>
+              <a:rPr lang="nl-NL" dirty="0" err="1"/>
+              <a:t>e_PCed</a:t>
+            </a:r>
+            <a:endParaRPr dirty="0"/>
           </a:p>
           <a:p>
             <a:pPr marL="0" lvl="0" indent="0" algn="l" rtl="0">
@@ -24909,7 +24933,7 @@
               </a:spcAft>
               <a:buNone/>
             </a:pPr>
-            <a:endParaRPr sz="1600"/>
+            <a:endParaRPr sz="1600" dirty="0"/>
           </a:p>
           <a:p>
             <a:pPr marL="0" lvl="0" indent="0" algn="l" rtl="0">
@@ -24922,10 +24946,18 @@
               <a:buNone/>
             </a:pPr>
             <a:r>
-              <a:rPr lang="nl-NL"/>
-              <a:t>c.PCld;  e.PCld</a:t>
+              <a:rPr lang="nl-NL" dirty="0" err="1"/>
+              <a:t>c_PCld</a:t>
             </a:r>
-            <a:endParaRPr/>
+            <a:r>
+              <a:rPr lang="nl-NL" dirty="0"/>
+              <a:t>;  </a:t>
+            </a:r>
+            <a:r>
+              <a:rPr lang="nl-NL" dirty="0" err="1"/>
+              <a:t>e_PCld</a:t>
+            </a:r>
+            <a:endParaRPr dirty="0"/>
           </a:p>
           <a:p>
             <a:pPr marL="0" lvl="0" indent="0" algn="l" rtl="0">
@@ -24937,7 +24969,7 @@
               </a:spcAft>
               <a:buNone/>
             </a:pPr>
-            <a:endParaRPr/>
+            <a:endParaRPr dirty="0"/>
           </a:p>
           <a:p>
             <a:pPr marL="0" lvl="0" indent="0" algn="l" rtl="0">
@@ -24949,7 +24981,7 @@
               </a:spcAft>
               <a:buNone/>
             </a:pPr>
-            <a:endParaRPr/>
+            <a:endParaRPr dirty="0"/>
           </a:p>
           <a:p>
             <a:pPr marL="0" lvl="0" indent="0" algn="l" rtl="0">
@@ -24961,7 +24993,7 @@
               </a:spcAft>
               <a:buNone/>
             </a:pPr>
-            <a:endParaRPr/>
+            <a:endParaRPr dirty="0"/>
           </a:p>
           <a:p>
             <a:pPr marL="0" lvl="0" indent="0" algn="l" rtl="0">
@@ -24973,7 +25005,7 @@
               </a:spcAft>
               <a:buNone/>
             </a:pPr>
-            <a:endParaRPr/>
+            <a:endParaRPr dirty="0"/>
           </a:p>
           <a:p>
             <a:pPr marL="0" lvl="0" indent="0" algn="l" rtl="0">
@@ -24985,7 +25017,7 @@
               </a:spcAft>
               <a:buNone/>
             </a:pPr>
-            <a:endParaRPr/>
+            <a:endParaRPr dirty="0"/>
           </a:p>
           <a:p>
             <a:pPr marL="0" lvl="0" indent="0" algn="l" rtl="0">
@@ -24998,10 +25030,18 @@
               <a:buNone/>
             </a:pPr>
             <a:r>
-              <a:rPr lang="nl-NL"/>
-              <a:t>c.HCed; e.HCed</a:t>
+              <a:rPr lang="nl-NL" dirty="0" err="1"/>
+              <a:t>c_HCed</a:t>
             </a:r>
-            <a:endParaRPr/>
+            <a:r>
+              <a:rPr lang="nl-NL" dirty="0"/>
+              <a:t>; </a:t>
+            </a:r>
+            <a:r>
+              <a:rPr lang="nl-NL" dirty="0" err="1"/>
+              <a:t>e_HCed</a:t>
+            </a:r>
+            <a:endParaRPr dirty="0"/>
           </a:p>
           <a:p>
             <a:pPr marL="0" lvl="0" indent="0" algn="l" rtl="0">
@@ -25013,7 +25053,7 @@
               </a:spcAft>
               <a:buNone/>
             </a:pPr>
-            <a:endParaRPr sz="1600"/>
+            <a:endParaRPr sz="1600" dirty="0"/>
           </a:p>
           <a:p>
             <a:pPr marL="0" lvl="0" indent="0" algn="l" rtl="0">
@@ -25026,10 +25066,18 @@
               <a:buNone/>
             </a:pPr>
             <a:r>
+              <a:rPr lang="nl-NL" dirty="0" err="1"/>
+              <a:t>c_HCld</a:t>
+            </a:r>
+            <a:r>
+              <a:rPr lang="nl-NL" dirty="0"/>
+              <a:t>;  </a:t>
+            </a:r>
+            <a:r>
               <a:rPr lang="nl-NL"/>
-              <a:t>c.HCld;  e.HCld</a:t>
+              <a:t>e_HCld</a:t>
             </a:r>
-            <a:endParaRPr/>
+            <a:endParaRPr dirty="0"/>
           </a:p>
         </p:txBody>
       </p:sp>

</xml_diff>